<commit_message>
added notes to page 1
</commit_message>
<xml_diff>
--- a/git_Mod1_Introduction.pptx
+++ b/git_Mod1_Introduction.pptx
@@ -533,11 +533,11 @@
           <c:showBubbleSize val="0"/>
         </c:dLbls>
         <c:gapWidth val="150"/>
-        <c:axId val="187930880"/>
-        <c:axId val="187940864"/>
+        <c:axId val="48148480"/>
+        <c:axId val="48150016"/>
       </c:barChart>
       <c:catAx>
-        <c:axId val="187930880"/>
+        <c:axId val="48148480"/>
         <c:scaling>
           <c:orientation val="minMax"/>
         </c:scaling>
@@ -546,7 +546,7 @@
         <c:majorTickMark val="none"/>
         <c:minorTickMark val="none"/>
         <c:tickLblPos val="nextTo"/>
-        <c:crossAx val="187940864"/>
+        <c:crossAx val="48150016"/>
         <c:crosses val="autoZero"/>
         <c:auto val="1"/>
         <c:lblAlgn val="ctr"/>
@@ -554,7 +554,7 @@
         <c:noMultiLvlLbl val="0"/>
       </c:catAx>
       <c:valAx>
-        <c:axId val="187940864"/>
+        <c:axId val="48150016"/>
         <c:scaling>
           <c:orientation val="minMax"/>
         </c:scaling>
@@ -578,14 +578,13 @@
             <a:noFill/>
           </a:ln>
         </c:spPr>
-        <c:crossAx val="187930880"/>
+        <c:crossAx val="48148480"/>
         <c:crosses val="autoZero"/>
         <c:crossBetween val="between"/>
       </c:valAx>
     </c:plotArea>
     <c:legend>
       <c:legendPos val="r"/>
-      <c:layout/>
       <c:overlay val="0"/>
       <c:spPr>
         <a:solidFill>
@@ -1086,11 +1085,11 @@
         </c:dLbls>
         <c:gapWidth val="150"/>
         <c:overlap val="100"/>
-        <c:axId val="188022784"/>
-        <c:axId val="188024320"/>
+        <c:axId val="48653824"/>
+        <c:axId val="48655360"/>
       </c:barChart>
       <c:catAx>
-        <c:axId val="188022784"/>
+        <c:axId val="48653824"/>
         <c:scaling>
           <c:orientation val="minMax"/>
         </c:scaling>
@@ -1099,7 +1098,7 @@
         <c:majorTickMark val="none"/>
         <c:minorTickMark val="none"/>
         <c:tickLblPos val="nextTo"/>
-        <c:crossAx val="188024320"/>
+        <c:crossAx val="48655360"/>
         <c:crosses val="autoZero"/>
         <c:auto val="1"/>
         <c:lblAlgn val="ctr"/>
@@ -1107,7 +1106,7 @@
         <c:noMultiLvlLbl val="0"/>
       </c:catAx>
       <c:valAx>
-        <c:axId val="188024320"/>
+        <c:axId val="48655360"/>
         <c:scaling>
           <c:orientation val="minMax"/>
         </c:scaling>
@@ -1131,14 +1130,13 @@
             <a:noFill/>
           </a:ln>
         </c:spPr>
-        <c:crossAx val="188022784"/>
+        <c:crossAx val="48653824"/>
         <c:crosses val="autoZero"/>
         <c:crossBetween val="between"/>
       </c:valAx>
     </c:plotArea>
     <c:legend>
       <c:legendPos val="r"/>
-      <c:layout/>
       <c:overlay val="0"/>
       <c:spPr>
         <a:solidFill>
@@ -1656,11 +1654,11 @@
         </c:dLbls>
         <c:marker val="1"/>
         <c:smooth val="0"/>
-        <c:axId val="188152448"/>
-        <c:axId val="188179200"/>
+        <c:axId val="56697216"/>
+        <c:axId val="56699136"/>
       </c:lineChart>
       <c:catAx>
-        <c:axId val="188152448"/>
+        <c:axId val="56697216"/>
         <c:scaling>
           <c:orientation val="minMax"/>
         </c:scaling>
@@ -1669,7 +1667,7 @@
         <c:majorTickMark val="none"/>
         <c:minorTickMark val="none"/>
         <c:tickLblPos val="nextTo"/>
-        <c:crossAx val="188179200"/>
+        <c:crossAx val="56699136"/>
         <c:crosses val="autoZero"/>
         <c:auto val="1"/>
         <c:lblAlgn val="ctr"/>
@@ -1677,7 +1675,7 @@
         <c:noMultiLvlLbl val="0"/>
       </c:catAx>
       <c:valAx>
-        <c:axId val="188179200"/>
+        <c:axId val="56699136"/>
         <c:scaling>
           <c:orientation val="minMax"/>
         </c:scaling>
@@ -1701,14 +1699,13 @@
             <a:noFill/>
           </a:ln>
         </c:spPr>
-        <c:crossAx val="188152448"/>
+        <c:crossAx val="56697216"/>
         <c:crosses val="autoZero"/>
         <c:crossBetween val="between"/>
       </c:valAx>
     </c:plotArea>
     <c:legend>
       <c:legendPos val="r"/>
-      <c:layout/>
       <c:overlay val="0"/>
       <c:spPr>
         <a:solidFill>
@@ -1942,7 +1939,6 @@
     </c:plotArea>
     <c:legend>
       <c:legendPos val="r"/>
-      <c:layout/>
       <c:overlay val="0"/>
       <c:txPr>
         <a:bodyPr/>
@@ -2444,11 +2440,11 @@
         </c:dLbls>
         <c:gapWidth val="150"/>
         <c:overlap val="100"/>
-        <c:axId val="188407808"/>
-        <c:axId val="188409344"/>
+        <c:axId val="56780288"/>
+        <c:axId val="56781824"/>
       </c:barChart>
       <c:catAx>
-        <c:axId val="188407808"/>
+        <c:axId val="56780288"/>
         <c:scaling>
           <c:orientation val="minMax"/>
         </c:scaling>
@@ -2457,7 +2453,7 @@
         <c:majorTickMark val="none"/>
         <c:minorTickMark val="none"/>
         <c:tickLblPos val="nextTo"/>
-        <c:crossAx val="188409344"/>
+        <c:crossAx val="56781824"/>
         <c:crosses val="autoZero"/>
         <c:auto val="1"/>
         <c:lblAlgn val="ctr"/>
@@ -2465,7 +2461,7 @@
         <c:noMultiLvlLbl val="0"/>
       </c:catAx>
       <c:valAx>
-        <c:axId val="188409344"/>
+        <c:axId val="56781824"/>
         <c:scaling>
           <c:orientation val="minMax"/>
         </c:scaling>
@@ -2489,14 +2485,13 @@
             <a:noFill/>
           </a:ln>
         </c:spPr>
-        <c:crossAx val="188407808"/>
+        <c:crossAx val="56780288"/>
         <c:crosses val="autoZero"/>
         <c:crossBetween val="between"/>
       </c:valAx>
     </c:plotArea>
     <c:legend>
       <c:legendPos val="r"/>
-      <c:layout/>
       <c:overlay val="0"/>
       <c:spPr>
         <a:solidFill>
@@ -2846,7 +2841,7 @@
             <a:fld id="{C7610C0E-43C4-4C6B-ADC3-72FEA0A55427}" type="datetimeFigureOut">
               <a:rPr lang="en-US" smtClean="0"/>
               <a:pPr/>
-              <a:t>2/8/2016</a:t>
+              <a:t>2/9/2016</a:t>
             </a:fld>
             <a:endParaRPr lang="en-US"/>
           </a:p>
@@ -4353,7 +4348,7 @@
             <a:fld id="{54FEA1FF-4A34-4477-ABDE-9C72F8F54362}" type="datetimeFigureOut">
               <a:rPr lang="en-US" smtClean="0"/>
               <a:pPr/>
-              <a:t>2/8/2016</a:t>
+              <a:t>2/9/2016</a:t>
             </a:fld>
             <a:endParaRPr lang="en-US"/>
           </a:p>
@@ -6046,6 +6041,18 @@
           <a:bodyPr/>
           <a:lstStyle/>
           <a:p>
+            <a:r>
+              <a:rPr lang="en-US" dirty="0" smtClean="0"/>
+              <a:t>Check for these</a:t>
+            </a:r>
+            <a:r>
+              <a:rPr lang="en-US" baseline="0" dirty="0" smtClean="0"/>
+              <a:t> new </a:t>
+            </a:r>
+            <a:r>
+              <a:rPr lang="en-US" baseline="0" smtClean="0"/>
+              <a:t>knotes</a:t>
+            </a:r>
             <a:endParaRPr lang="en-US" dirty="0"/>
           </a:p>
         </p:txBody>
@@ -6076,7 +6083,7 @@
     </p:spTree>
     <p:extLst>
       <p:ext uri="{BB962C8B-B14F-4D97-AF65-F5344CB8AC3E}">
-        <p14:creationId xmlns:p14="http://schemas.microsoft.com/office/powerpoint/2010/main" val="3989260103"/>
+        <p14:creationId xmlns:p14="http://schemas.microsoft.com/office/powerpoint/2010/main" val="3173417601"/>
       </p:ext>
     </p:extLst>
   </p:cSld>
@@ -6087,6 +6094,172 @@
 </file>
 
 <file path=ppt/notesSlides/notesSlide10.xml><?xml version="1.0" encoding="utf-8"?>
+<p:notes xmlns:a="http://schemas.openxmlformats.org/drawingml/2006/main" xmlns:r="http://schemas.openxmlformats.org/officeDocument/2006/relationships" xmlns:p="http://schemas.openxmlformats.org/presentationml/2006/main">
+  <p:cSld>
+    <p:spTree>
+      <p:nvGrpSpPr>
+        <p:cNvPr id="1" name=""/>
+        <p:cNvGrpSpPr/>
+        <p:nvPr/>
+      </p:nvGrpSpPr>
+      <p:grpSpPr>
+        <a:xfrm>
+          <a:off x="0" y="0"/>
+          <a:ext cx="0" cy="0"/>
+          <a:chOff x="0" y="0"/>
+          <a:chExt cx="0" cy="0"/>
+        </a:xfrm>
+      </p:grpSpPr>
+      <p:sp>
+        <p:nvSpPr>
+          <p:cNvPr id="2" name="Slide Image Placeholder 1"/>
+          <p:cNvSpPr>
+            <a:spLocks noGrp="1" noRot="1" noChangeAspect="1"/>
+          </p:cNvSpPr>
+          <p:nvPr>
+            <p:ph type="sldImg"/>
+          </p:nvPr>
+        </p:nvSpPr>
+        <p:spPr/>
+      </p:sp>
+      <p:sp>
+        <p:nvSpPr>
+          <p:cNvPr id="3" name="Notes Placeholder 2"/>
+          <p:cNvSpPr>
+            <a:spLocks noGrp="1"/>
+          </p:cNvSpPr>
+          <p:nvPr>
+            <p:ph type="body" idx="1"/>
+          </p:nvPr>
+        </p:nvSpPr>
+        <p:spPr/>
+        <p:txBody>
+          <a:bodyPr/>
+          <a:lstStyle/>
+          <a:p>
+            <a:r>
+              <a:rPr lang="en-US" dirty="0" smtClean="0"/>
+              <a:t>Data Mover operates mostly the same way for TD/Aster and TD/Hadoop data moves. User intent is entered via the</a:t>
+            </a:r>
+            <a:r>
+              <a:rPr lang="en-US" baseline="0" dirty="0" smtClean="0"/>
+              <a:t> same two mechanisms of the Viewpoint Portlet and Command Line Interface. It is then </a:t>
+            </a:r>
+            <a:r>
+              <a:rPr lang="en-US" dirty="0" smtClean="0"/>
+              <a:t>translated</a:t>
+            </a:r>
+            <a:r>
+              <a:rPr lang="en-US" baseline="0" dirty="0" smtClean="0"/>
+              <a:t> into a Data Mover job to do the actual move.</a:t>
+            </a:r>
+          </a:p>
+          <a:p>
+            <a:endParaRPr lang="en-US" baseline="0" dirty="0" smtClean="0"/>
+          </a:p>
+          <a:p>
+            <a:pPr marL="0" indent="0">
+              <a:buNone/>
+            </a:pPr>
+            <a:r>
+              <a:rPr lang="en-US" baseline="0" dirty="0" smtClean="0"/>
+              <a:t>There are different utility options for Data Mover to choose from in Aster and Hadoop data movements.</a:t>
+            </a:r>
+          </a:p>
+          <a:p>
+            <a:pPr lvl="1"/>
+            <a:r>
+              <a:rPr lang="en-US" baseline="0" dirty="0" smtClean="0"/>
+              <a:t>For Aster the Teradata-Aster Connector is used. This is based on a combination of TPT Fastload protocol and </a:t>
+            </a:r>
+            <a:r>
+              <a:rPr lang="en-US" baseline="0" dirty="0" err="1" smtClean="0"/>
+              <a:t>SQl</a:t>
+            </a:r>
+            <a:r>
+              <a:rPr lang="en-US" baseline="0" dirty="0" smtClean="0"/>
+              <a:t>-MR commands.</a:t>
+            </a:r>
+          </a:p>
+          <a:p>
+            <a:pPr lvl="1"/>
+            <a:r>
+              <a:rPr lang="en-US" baseline="0" dirty="0" smtClean="0"/>
+              <a:t>For Hadoop the Teradata Connector for Hadoop or the SQL-H Query Grid command is chosen. Data Mover will use SQL-H if the site is on TD 14.10 or greater and has purchased the Query Grid option.</a:t>
+            </a:r>
+            <a:br>
+              <a:rPr lang="en-US" baseline="0" dirty="0" smtClean="0"/>
+            </a:br>
+            <a:endParaRPr lang="en-US" baseline="0" dirty="0" smtClean="0"/>
+          </a:p>
+          <a:p>
+            <a:pPr marL="0" indent="0">
+              <a:buNone/>
+            </a:pPr>
+            <a:r>
+              <a:rPr lang="en-US" baseline="0" dirty="0" smtClean="0"/>
+              <a:t>Another key difference is that the data being moved does not pass through the Data Mover TMS. The two systems communicate directly with each other which avoids the extra network hop. Data Mover creates the SQL commands necessary to perform the data move and then gets out of the way.</a:t>
+            </a:r>
+            <a:endParaRPr lang="en-US" dirty="0"/>
+          </a:p>
+        </p:txBody>
+      </p:sp>
+      <p:sp>
+        <p:nvSpPr>
+          <p:cNvPr id="4" name="Slide Number Placeholder 3"/>
+          <p:cNvSpPr>
+            <a:spLocks noGrp="1"/>
+          </p:cNvSpPr>
+          <p:nvPr>
+            <p:ph type="sldNum" sz="quarter" idx="10"/>
+          </p:nvPr>
+        </p:nvSpPr>
+        <p:spPr>
+          <a:xfrm>
+            <a:off x="3884615" y="8685213"/>
+            <a:ext cx="2971800" cy="457200"/>
+          </a:xfrm>
+          <a:prstGeom prst="rect">
+            <a:avLst/>
+          </a:prstGeom>
+        </p:spPr>
+        <p:txBody>
+          <a:bodyPr lIns="90396" tIns="45198" rIns="90396" bIns="45198"/>
+          <a:lstStyle/>
+          <a:p>
+            <a:fld id="{FF04AF13-00D5-4493-9191-4AE0E8CE6465}" type="slidenum">
+              <a:rPr lang="en-US" smtClean="0">
+                <a:solidFill>
+                  <a:prstClr val="black"/>
+                </a:solidFill>
+                <a:latin typeface="Calibri"/>
+              </a:rPr>
+              <a:pPr/>
+              <a:t>12</a:t>
+            </a:fld>
+            <a:endParaRPr lang="en-US">
+              <a:solidFill>
+                <a:prstClr val="black"/>
+              </a:solidFill>
+              <a:latin typeface="Calibri"/>
+            </a:endParaRPr>
+          </a:p>
+        </p:txBody>
+      </p:sp>
+    </p:spTree>
+    <p:extLst>
+      <p:ext uri="{BB962C8B-B14F-4D97-AF65-F5344CB8AC3E}">
+        <p14:creationId xmlns:p14="http://schemas.microsoft.com/office/powerpoint/2010/main" val="2179764985"/>
+      </p:ext>
+    </p:extLst>
+  </p:cSld>
+  <p:clrMapOvr>
+    <a:masterClrMapping/>
+  </p:clrMapOvr>
+</p:notes>
+</file>
+
+<file path=ppt/notesSlides/notesSlide11.xml><?xml version="1.0" encoding="utf-8"?>
 <p:notes xmlns:a="http://schemas.openxmlformats.org/drawingml/2006/main" xmlns:r="http://schemas.openxmlformats.org/officeDocument/2006/relationships" xmlns:p="http://schemas.openxmlformats.org/presentationml/2006/main">
   <p:cSld>
     <p:spTree>
@@ -6431,7 +6604,7 @@
 </p:notes>
 </file>
 
-<file path=ppt/notesSlides/notesSlide11.xml><?xml version="1.0" encoding="utf-8"?>
+<file path=ppt/notesSlides/notesSlide12.xml><?xml version="1.0" encoding="utf-8"?>
 <p:notes xmlns:a="http://schemas.openxmlformats.org/drawingml/2006/main" xmlns:r="http://schemas.openxmlformats.org/officeDocument/2006/relationships" xmlns:p="http://schemas.openxmlformats.org/presentationml/2006/main">
   <p:cSld>
     <p:spTree>
@@ -6714,7 +6887,7 @@
 </p:notes>
 </file>
 
-<file path=ppt/notesSlides/notesSlide12.xml><?xml version="1.0" encoding="utf-8"?>
+<file path=ppt/notesSlides/notesSlide13.xml><?xml version="1.0" encoding="utf-8"?>
 <p:notes xmlns:a="http://schemas.openxmlformats.org/drawingml/2006/main" xmlns:r="http://schemas.openxmlformats.org/officeDocument/2006/relationships" xmlns:p="http://schemas.openxmlformats.org/presentationml/2006/main">
   <p:cSld>
     <p:spTree>
@@ -7010,7 +7183,7 @@
 </p:notes>
 </file>
 
-<file path=ppt/notesSlides/notesSlide13.xml><?xml version="1.0" encoding="utf-8"?>
+<file path=ppt/notesSlides/notesSlide14.xml><?xml version="1.0" encoding="utf-8"?>
 <p:notes xmlns:a="http://schemas.openxmlformats.org/drawingml/2006/main" xmlns:r="http://schemas.openxmlformats.org/officeDocument/2006/relationships" xmlns:p="http://schemas.openxmlformats.org/presentationml/2006/main">
   <p:cSld>
     <p:bg>
@@ -7256,7 +7429,7 @@
 </p:notes>
 </file>
 
-<file path=ppt/notesSlides/notesSlide14.xml><?xml version="1.0" encoding="utf-8"?>
+<file path=ppt/notesSlides/notesSlide15.xml><?xml version="1.0" encoding="utf-8"?>
 <p:notes xmlns:a="http://schemas.openxmlformats.org/drawingml/2006/main" xmlns:r="http://schemas.openxmlformats.org/officeDocument/2006/relationships" xmlns:p="http://schemas.openxmlformats.org/presentationml/2006/main">
   <p:cSld>
     <p:bg>
@@ -7472,7 +7645,7 @@
 </p:notes>
 </file>
 
-<file path=ppt/notesSlides/notesSlide15.xml><?xml version="1.0" encoding="utf-8"?>
+<file path=ppt/notesSlides/notesSlide16.xml><?xml version="1.0" encoding="utf-8"?>
 <p:notes xmlns:a="http://schemas.openxmlformats.org/drawingml/2006/main" xmlns:r="http://schemas.openxmlformats.org/officeDocument/2006/relationships" xmlns:p="http://schemas.openxmlformats.org/presentationml/2006/main">
   <p:cSld>
     <p:spTree>
@@ -7789,7 +7962,7 @@
 </p:notes>
 </file>
 
-<file path=ppt/notesSlides/notesSlide16.xml><?xml version="1.0" encoding="utf-8"?>
+<file path=ppt/notesSlides/notesSlide17.xml><?xml version="1.0" encoding="utf-8"?>
 <p:notes xmlns:a="http://schemas.openxmlformats.org/drawingml/2006/main" xmlns:r="http://schemas.openxmlformats.org/officeDocument/2006/relationships" xmlns:p="http://schemas.openxmlformats.org/presentationml/2006/main">
   <p:cSld>
     <p:bg>
@@ -7948,7 +8121,7 @@
 </p:notes>
 </file>
 
-<file path=ppt/notesSlides/notesSlide17.xml><?xml version="1.0" encoding="utf-8"?>
+<file path=ppt/notesSlides/notesSlide18.xml><?xml version="1.0" encoding="utf-8"?>
 <p:notes xmlns:a="http://schemas.openxmlformats.org/drawingml/2006/main" xmlns:r="http://schemas.openxmlformats.org/officeDocument/2006/relationships" xmlns:p="http://schemas.openxmlformats.org/presentationml/2006/main">
   <p:cSld>
     <p:bg>
@@ -8107,7 +8280,7 @@
 </p:notes>
 </file>
 
-<file path=ppt/notesSlides/notesSlide18.xml><?xml version="1.0" encoding="utf-8"?>
+<file path=ppt/notesSlides/notesSlide19.xml><?xml version="1.0" encoding="utf-8"?>
 <p:notes xmlns:a="http://schemas.openxmlformats.org/drawingml/2006/main" xmlns:r="http://schemas.openxmlformats.org/officeDocument/2006/relationships" xmlns:p="http://schemas.openxmlformats.org/presentationml/2006/main">
   <p:cSld>
     <p:spTree>
@@ -8374,311 +8547,6 @@
                 </a:spcBef>
               </a:pPr>
               <a:t>23</a:t>
-            </a:fld>
-            <a:endParaRPr lang="en-US" altLang="en-US" smtClean="0">
-              <a:latin typeface="Verdana" pitchFamily="34" charset="0"/>
-              <a:ea typeface="ＭＳ Ｐゴシック" pitchFamily="34" charset="-128"/>
-            </a:endParaRPr>
-          </a:p>
-        </p:txBody>
-      </p:sp>
-    </p:spTree>
-  </p:cSld>
-  <p:clrMapOvr>
-    <a:masterClrMapping/>
-  </p:clrMapOvr>
-</p:notes>
-</file>
-
-<file path=ppt/notesSlides/notesSlide19.xml><?xml version="1.0" encoding="utf-8"?>
-<p:notes xmlns:a="http://schemas.openxmlformats.org/drawingml/2006/main" xmlns:r="http://schemas.openxmlformats.org/officeDocument/2006/relationships" xmlns:p="http://schemas.openxmlformats.org/presentationml/2006/main">
-  <p:cSld>
-    <p:spTree>
-      <p:nvGrpSpPr>
-        <p:cNvPr id="1" name=""/>
-        <p:cNvGrpSpPr/>
-        <p:nvPr/>
-      </p:nvGrpSpPr>
-      <p:grpSpPr>
-        <a:xfrm>
-          <a:off x="0" y="0"/>
-          <a:ext cx="0" cy="0"/>
-          <a:chOff x="0" y="0"/>
-          <a:chExt cx="0" cy="0"/>
-        </a:xfrm>
-      </p:grpSpPr>
-      <p:sp>
-        <p:nvSpPr>
-          <p:cNvPr id="34818" name="Slide Image Placeholder 1"/>
-          <p:cNvSpPr>
-            <a:spLocks noGrp="1" noRot="1" noChangeAspect="1" noTextEdit="1"/>
-          </p:cNvSpPr>
-          <p:nvPr>
-            <p:ph type="sldImg"/>
-          </p:nvPr>
-        </p:nvSpPr>
-        <p:spPr bwMode="auto">
-          <a:noFill/>
-          <a:ln>
-            <a:solidFill>
-              <a:srgbClr val="000000"/>
-            </a:solidFill>
-            <a:miter lim="800000"/>
-            <a:headEnd/>
-            <a:tailEnd/>
-          </a:ln>
-          <a:extLst>
-            <a:ext uri="{909E8E84-426E-40DD-AFC4-6F175D3DCCD1}">
-              <a14:hiddenFill xmlns:a14="http://schemas.microsoft.com/office/drawing/2010/main">
-                <a:solidFill>
-                  <a:srgbClr val="FFFFFF"/>
-                </a:solidFill>
-              </a14:hiddenFill>
-            </a:ext>
-          </a:extLst>
-        </p:spPr>
-      </p:sp>
-      <p:sp>
-        <p:nvSpPr>
-          <p:cNvPr id="34819" name="Notes Placeholder 2"/>
-          <p:cNvSpPr>
-            <a:spLocks noGrp="1"/>
-          </p:cNvSpPr>
-          <p:nvPr>
-            <p:ph type="body" idx="1"/>
-          </p:nvPr>
-        </p:nvSpPr>
-        <p:spPr bwMode="auto">
-          <a:noFill/>
-          <a:extLst>
-            <a:ext uri="{909E8E84-426E-40DD-AFC4-6F175D3DCCD1}">
-              <a14:hiddenFill xmlns:a14="http://schemas.microsoft.com/office/drawing/2010/main">
-                <a:solidFill>
-                  <a:srgbClr val="FFFFFF"/>
-                </a:solidFill>
-              </a14:hiddenFill>
-            </a:ext>
-            <a:ext uri="{91240B29-F687-4F45-9708-019B960494DF}">
-              <a14:hiddenLine xmlns:a14="http://schemas.microsoft.com/office/drawing/2010/main" w="9525">
-                <a:solidFill>
-                  <a:srgbClr val="000000"/>
-                </a:solidFill>
-                <a:miter lim="800000"/>
-                <a:headEnd/>
-                <a:tailEnd/>
-              </a14:hiddenLine>
-            </a:ext>
-          </a:extLst>
-        </p:spPr>
-        <p:txBody>
-          <a:bodyPr wrap="square" numCol="1" anchor="t" anchorCtr="0" compatLnSpc="1">
-            <a:prstTxWarp prst="textNoShape">
-              <a:avLst/>
-            </a:prstTxWarp>
-          </a:bodyPr>
-          <a:lstStyle/>
-          <a:p>
-            <a:r>
-              <a:rPr lang="en-CA" altLang="en-US" b="1" smtClean="0"/>
-              <a:t>Main point: </a:t>
-            </a:r>
-            <a:r>
-              <a:rPr lang="en-CA" altLang="en-US" smtClean="0"/>
-              <a:t>Query Director didn’t officially support writes, Unity’s Passive routing does.</a:t>
-            </a:r>
-          </a:p>
-          <a:p>
-            <a:r>
-              <a:rPr lang="en-CA" altLang="en-US" smtClean="0"/>
-              <a:t>- You can </a:t>
-            </a:r>
-            <a:r>
-              <a:rPr lang="en-CA" altLang="en-US" b="1" i="1" u="sng" smtClean="0"/>
-              <a:t>choose</a:t>
-            </a:r>
-            <a:r>
-              <a:rPr lang="en-CA" altLang="en-US" smtClean="0"/>
-              <a:t> if you want to allow writes to managed tables. It’s up to you.</a:t>
-            </a:r>
-            <a:endParaRPr lang="en-US" altLang="en-US" smtClean="0"/>
-          </a:p>
-        </p:txBody>
-      </p:sp>
-      <p:sp>
-        <p:nvSpPr>
-          <p:cNvPr id="34820" name="Slide Number Placeholder 3"/>
-          <p:cNvSpPr>
-            <a:spLocks noGrp="1"/>
-          </p:cNvSpPr>
-          <p:nvPr>
-            <p:ph type="sldNum" sz="quarter" idx="5"/>
-          </p:nvPr>
-        </p:nvSpPr>
-        <p:spPr bwMode="auto">
-          <a:xfrm>
-            <a:off x="3884613" y="8685213"/>
-            <a:ext cx="2971800" cy="457200"/>
-          </a:xfrm>
-          <a:prstGeom prst="rect">
-            <a:avLst/>
-          </a:prstGeom>
-          <a:noFill/>
-          <a:extLst>
-            <a:ext uri="{909E8E84-426E-40DD-AFC4-6F175D3DCCD1}">
-              <a14:hiddenFill xmlns:a14="http://schemas.microsoft.com/office/drawing/2010/main">
-                <a:solidFill>
-                  <a:srgbClr val="FFFFFF"/>
-                </a:solidFill>
-              </a14:hiddenFill>
-            </a:ext>
-            <a:ext uri="{91240B29-F687-4F45-9708-019B960494DF}">
-              <a14:hiddenLine xmlns:a14="http://schemas.microsoft.com/office/drawing/2010/main" w="9525">
-                <a:solidFill>
-                  <a:srgbClr val="000000"/>
-                </a:solidFill>
-                <a:miter lim="800000"/>
-                <a:headEnd/>
-                <a:tailEnd/>
-              </a14:hiddenLine>
-            </a:ext>
-          </a:extLst>
-        </p:spPr>
-        <p:txBody>
-          <a:bodyPr wrap="square" numCol="1" anchorCtr="0" compatLnSpc="1">
-            <a:prstTxWarp prst="textNoShape">
-              <a:avLst/>
-            </a:prstTxWarp>
-          </a:bodyPr>
-          <a:lstStyle>
-            <a:lvl1pPr eaLnBrk="0" hangingPunct="0">
-              <a:spcBef>
-                <a:spcPct val="30000"/>
-              </a:spcBef>
-              <a:defRPr sz="1200">
-                <a:solidFill>
-                  <a:schemeClr val="tx1"/>
-                </a:solidFill>
-                <a:latin typeface="Calibri" pitchFamily="34" charset="0"/>
-              </a:defRPr>
-            </a:lvl1pPr>
-            <a:lvl2pPr marL="742950" indent="-285750" eaLnBrk="0" hangingPunct="0">
-              <a:spcBef>
-                <a:spcPct val="30000"/>
-              </a:spcBef>
-              <a:defRPr sz="1200">
-                <a:solidFill>
-                  <a:schemeClr val="tx1"/>
-                </a:solidFill>
-                <a:latin typeface="Calibri" pitchFamily="34" charset="0"/>
-              </a:defRPr>
-            </a:lvl2pPr>
-            <a:lvl3pPr marL="1143000" indent="-228600" eaLnBrk="0" hangingPunct="0">
-              <a:spcBef>
-                <a:spcPct val="30000"/>
-              </a:spcBef>
-              <a:defRPr sz="1200">
-                <a:solidFill>
-                  <a:schemeClr val="tx1"/>
-                </a:solidFill>
-                <a:latin typeface="Calibri" pitchFamily="34" charset="0"/>
-              </a:defRPr>
-            </a:lvl3pPr>
-            <a:lvl4pPr marL="1600200" indent="-228600" eaLnBrk="0" hangingPunct="0">
-              <a:spcBef>
-                <a:spcPct val="30000"/>
-              </a:spcBef>
-              <a:defRPr sz="1200">
-                <a:solidFill>
-                  <a:schemeClr val="tx1"/>
-                </a:solidFill>
-                <a:latin typeface="Calibri" pitchFamily="34" charset="0"/>
-              </a:defRPr>
-            </a:lvl4pPr>
-            <a:lvl5pPr marL="2057400" indent="-228600" eaLnBrk="0" hangingPunct="0">
-              <a:spcBef>
-                <a:spcPct val="30000"/>
-              </a:spcBef>
-              <a:defRPr sz="1200">
-                <a:solidFill>
-                  <a:schemeClr val="tx1"/>
-                </a:solidFill>
-                <a:latin typeface="Calibri" pitchFamily="34" charset="0"/>
-              </a:defRPr>
-            </a:lvl5pPr>
-            <a:lvl6pPr marL="2514600" indent="-228600" eaLnBrk="0" fontAlgn="base" hangingPunct="0">
-              <a:spcBef>
-                <a:spcPct val="30000"/>
-              </a:spcBef>
-              <a:spcAft>
-                <a:spcPct val="0"/>
-              </a:spcAft>
-              <a:defRPr sz="1200">
-                <a:solidFill>
-                  <a:schemeClr val="tx1"/>
-                </a:solidFill>
-                <a:latin typeface="Calibri" pitchFamily="34" charset="0"/>
-              </a:defRPr>
-            </a:lvl6pPr>
-            <a:lvl7pPr marL="2971800" indent="-228600" eaLnBrk="0" fontAlgn="base" hangingPunct="0">
-              <a:spcBef>
-                <a:spcPct val="30000"/>
-              </a:spcBef>
-              <a:spcAft>
-                <a:spcPct val="0"/>
-              </a:spcAft>
-              <a:defRPr sz="1200">
-                <a:solidFill>
-                  <a:schemeClr val="tx1"/>
-                </a:solidFill>
-                <a:latin typeface="Calibri" pitchFamily="34" charset="0"/>
-              </a:defRPr>
-            </a:lvl7pPr>
-            <a:lvl8pPr marL="3429000" indent="-228600" eaLnBrk="0" fontAlgn="base" hangingPunct="0">
-              <a:spcBef>
-                <a:spcPct val="30000"/>
-              </a:spcBef>
-              <a:spcAft>
-                <a:spcPct val="0"/>
-              </a:spcAft>
-              <a:defRPr sz="1200">
-                <a:solidFill>
-                  <a:schemeClr val="tx1"/>
-                </a:solidFill>
-                <a:latin typeface="Calibri" pitchFamily="34" charset="0"/>
-              </a:defRPr>
-            </a:lvl8pPr>
-            <a:lvl9pPr marL="3886200" indent="-228600" eaLnBrk="0" fontAlgn="base" hangingPunct="0">
-              <a:spcBef>
-                <a:spcPct val="30000"/>
-              </a:spcBef>
-              <a:spcAft>
-                <a:spcPct val="0"/>
-              </a:spcAft>
-              <a:defRPr sz="1200">
-                <a:solidFill>
-                  <a:schemeClr val="tx1"/>
-                </a:solidFill>
-                <a:latin typeface="Calibri" pitchFamily="34" charset="0"/>
-              </a:defRPr>
-            </a:lvl9pPr>
-          </a:lstStyle>
-          <a:p>
-            <a:pPr>
-              <a:spcBef>
-                <a:spcPct val="0"/>
-              </a:spcBef>
-            </a:pPr>
-            <a:fld id="{65EA47BA-C6D2-42E1-B6C1-ABC893F7CB61}" type="slidenum">
-              <a:rPr lang="en-US" altLang="en-US" smtClean="0">
-                <a:latin typeface="Verdana" pitchFamily="34" charset="0"/>
-                <a:ea typeface="ＭＳ Ｐゴシック" pitchFamily="34" charset="-128"/>
-              </a:rPr>
-              <a:pPr>
-                <a:spcBef>
-                  <a:spcPct val="0"/>
-                </a:spcBef>
-              </a:pPr>
-              <a:t>24</a:t>
             </a:fld>
             <a:endParaRPr lang="en-US" altLang="en-US" smtClean="0">
               <a:latin typeface="Verdana" pitchFamily="34" charset="0"/>
@@ -8739,14 +8607,7 @@
           <a:bodyPr/>
           <a:lstStyle/>
           <a:p>
-            <a:endParaRPr lang="en-US" sz="1200" b="0" i="0" u="none" strike="noStrike" kern="1200" baseline="0" dirty="0" smtClean="0">
-              <a:solidFill>
-                <a:schemeClr val="tx1"/>
-              </a:solidFill>
-              <a:latin typeface="+mn-lt"/>
-              <a:ea typeface="+mn-ea"/>
-              <a:cs typeface="+mn-cs"/>
-            </a:endParaRPr>
+            <a:endParaRPr lang="en-US" dirty="0"/>
           </a:p>
         </p:txBody>
       </p:sp>
@@ -8776,7 +8637,7 @@
     </p:spTree>
     <p:extLst>
       <p:ext uri="{BB962C8B-B14F-4D97-AF65-F5344CB8AC3E}">
-        <p14:creationId xmlns:p14="http://schemas.microsoft.com/office/powerpoint/2010/main" val="3650013572"/>
+        <p14:creationId xmlns:p14="http://schemas.microsoft.com/office/powerpoint/2010/main" val="3989260103"/>
       </p:ext>
     </p:extLst>
   </p:cSld>
@@ -8787,6 +8648,311 @@
 </file>
 
 <file path=ppt/notesSlides/notesSlide20.xml><?xml version="1.0" encoding="utf-8"?>
+<p:notes xmlns:a="http://schemas.openxmlformats.org/drawingml/2006/main" xmlns:r="http://schemas.openxmlformats.org/officeDocument/2006/relationships" xmlns:p="http://schemas.openxmlformats.org/presentationml/2006/main">
+  <p:cSld>
+    <p:spTree>
+      <p:nvGrpSpPr>
+        <p:cNvPr id="1" name=""/>
+        <p:cNvGrpSpPr/>
+        <p:nvPr/>
+      </p:nvGrpSpPr>
+      <p:grpSpPr>
+        <a:xfrm>
+          <a:off x="0" y="0"/>
+          <a:ext cx="0" cy="0"/>
+          <a:chOff x="0" y="0"/>
+          <a:chExt cx="0" cy="0"/>
+        </a:xfrm>
+      </p:grpSpPr>
+      <p:sp>
+        <p:nvSpPr>
+          <p:cNvPr id="34818" name="Slide Image Placeholder 1"/>
+          <p:cNvSpPr>
+            <a:spLocks noGrp="1" noRot="1" noChangeAspect="1" noTextEdit="1"/>
+          </p:cNvSpPr>
+          <p:nvPr>
+            <p:ph type="sldImg"/>
+          </p:nvPr>
+        </p:nvSpPr>
+        <p:spPr bwMode="auto">
+          <a:noFill/>
+          <a:ln>
+            <a:solidFill>
+              <a:srgbClr val="000000"/>
+            </a:solidFill>
+            <a:miter lim="800000"/>
+            <a:headEnd/>
+            <a:tailEnd/>
+          </a:ln>
+          <a:extLst>
+            <a:ext uri="{909E8E84-426E-40DD-AFC4-6F175D3DCCD1}">
+              <a14:hiddenFill xmlns:a14="http://schemas.microsoft.com/office/drawing/2010/main">
+                <a:solidFill>
+                  <a:srgbClr val="FFFFFF"/>
+                </a:solidFill>
+              </a14:hiddenFill>
+            </a:ext>
+          </a:extLst>
+        </p:spPr>
+      </p:sp>
+      <p:sp>
+        <p:nvSpPr>
+          <p:cNvPr id="34819" name="Notes Placeholder 2"/>
+          <p:cNvSpPr>
+            <a:spLocks noGrp="1"/>
+          </p:cNvSpPr>
+          <p:nvPr>
+            <p:ph type="body" idx="1"/>
+          </p:nvPr>
+        </p:nvSpPr>
+        <p:spPr bwMode="auto">
+          <a:noFill/>
+          <a:extLst>
+            <a:ext uri="{909E8E84-426E-40DD-AFC4-6F175D3DCCD1}">
+              <a14:hiddenFill xmlns:a14="http://schemas.microsoft.com/office/drawing/2010/main">
+                <a:solidFill>
+                  <a:srgbClr val="FFFFFF"/>
+                </a:solidFill>
+              </a14:hiddenFill>
+            </a:ext>
+            <a:ext uri="{91240B29-F687-4F45-9708-019B960494DF}">
+              <a14:hiddenLine xmlns:a14="http://schemas.microsoft.com/office/drawing/2010/main" w="9525">
+                <a:solidFill>
+                  <a:srgbClr val="000000"/>
+                </a:solidFill>
+                <a:miter lim="800000"/>
+                <a:headEnd/>
+                <a:tailEnd/>
+              </a14:hiddenLine>
+            </a:ext>
+          </a:extLst>
+        </p:spPr>
+        <p:txBody>
+          <a:bodyPr wrap="square" numCol="1" anchor="t" anchorCtr="0" compatLnSpc="1">
+            <a:prstTxWarp prst="textNoShape">
+              <a:avLst/>
+            </a:prstTxWarp>
+          </a:bodyPr>
+          <a:lstStyle/>
+          <a:p>
+            <a:r>
+              <a:rPr lang="en-CA" altLang="en-US" b="1" smtClean="0"/>
+              <a:t>Main point: </a:t>
+            </a:r>
+            <a:r>
+              <a:rPr lang="en-CA" altLang="en-US" smtClean="0"/>
+              <a:t>Query Director didn’t officially support writes, Unity’s Passive routing does.</a:t>
+            </a:r>
+          </a:p>
+          <a:p>
+            <a:r>
+              <a:rPr lang="en-CA" altLang="en-US" smtClean="0"/>
+              <a:t>- You can </a:t>
+            </a:r>
+            <a:r>
+              <a:rPr lang="en-CA" altLang="en-US" b="1" i="1" u="sng" smtClean="0"/>
+              <a:t>choose</a:t>
+            </a:r>
+            <a:r>
+              <a:rPr lang="en-CA" altLang="en-US" smtClean="0"/>
+              <a:t> if you want to allow writes to managed tables. It’s up to you.</a:t>
+            </a:r>
+            <a:endParaRPr lang="en-US" altLang="en-US" smtClean="0"/>
+          </a:p>
+        </p:txBody>
+      </p:sp>
+      <p:sp>
+        <p:nvSpPr>
+          <p:cNvPr id="34820" name="Slide Number Placeholder 3"/>
+          <p:cNvSpPr>
+            <a:spLocks noGrp="1"/>
+          </p:cNvSpPr>
+          <p:nvPr>
+            <p:ph type="sldNum" sz="quarter" idx="5"/>
+          </p:nvPr>
+        </p:nvSpPr>
+        <p:spPr bwMode="auto">
+          <a:xfrm>
+            <a:off x="3884613" y="8685213"/>
+            <a:ext cx="2971800" cy="457200"/>
+          </a:xfrm>
+          <a:prstGeom prst="rect">
+            <a:avLst/>
+          </a:prstGeom>
+          <a:noFill/>
+          <a:extLst>
+            <a:ext uri="{909E8E84-426E-40DD-AFC4-6F175D3DCCD1}">
+              <a14:hiddenFill xmlns:a14="http://schemas.microsoft.com/office/drawing/2010/main">
+                <a:solidFill>
+                  <a:srgbClr val="FFFFFF"/>
+                </a:solidFill>
+              </a14:hiddenFill>
+            </a:ext>
+            <a:ext uri="{91240B29-F687-4F45-9708-019B960494DF}">
+              <a14:hiddenLine xmlns:a14="http://schemas.microsoft.com/office/drawing/2010/main" w="9525">
+                <a:solidFill>
+                  <a:srgbClr val="000000"/>
+                </a:solidFill>
+                <a:miter lim="800000"/>
+                <a:headEnd/>
+                <a:tailEnd/>
+              </a14:hiddenLine>
+            </a:ext>
+          </a:extLst>
+        </p:spPr>
+        <p:txBody>
+          <a:bodyPr wrap="square" numCol="1" anchorCtr="0" compatLnSpc="1">
+            <a:prstTxWarp prst="textNoShape">
+              <a:avLst/>
+            </a:prstTxWarp>
+          </a:bodyPr>
+          <a:lstStyle>
+            <a:lvl1pPr eaLnBrk="0" hangingPunct="0">
+              <a:spcBef>
+                <a:spcPct val="30000"/>
+              </a:spcBef>
+              <a:defRPr sz="1200">
+                <a:solidFill>
+                  <a:schemeClr val="tx1"/>
+                </a:solidFill>
+                <a:latin typeface="Calibri" pitchFamily="34" charset="0"/>
+              </a:defRPr>
+            </a:lvl1pPr>
+            <a:lvl2pPr marL="742950" indent="-285750" eaLnBrk="0" hangingPunct="0">
+              <a:spcBef>
+                <a:spcPct val="30000"/>
+              </a:spcBef>
+              <a:defRPr sz="1200">
+                <a:solidFill>
+                  <a:schemeClr val="tx1"/>
+                </a:solidFill>
+                <a:latin typeface="Calibri" pitchFamily="34" charset="0"/>
+              </a:defRPr>
+            </a:lvl2pPr>
+            <a:lvl3pPr marL="1143000" indent="-228600" eaLnBrk="0" hangingPunct="0">
+              <a:spcBef>
+                <a:spcPct val="30000"/>
+              </a:spcBef>
+              <a:defRPr sz="1200">
+                <a:solidFill>
+                  <a:schemeClr val="tx1"/>
+                </a:solidFill>
+                <a:latin typeface="Calibri" pitchFamily="34" charset="0"/>
+              </a:defRPr>
+            </a:lvl3pPr>
+            <a:lvl4pPr marL="1600200" indent="-228600" eaLnBrk="0" hangingPunct="0">
+              <a:spcBef>
+                <a:spcPct val="30000"/>
+              </a:spcBef>
+              <a:defRPr sz="1200">
+                <a:solidFill>
+                  <a:schemeClr val="tx1"/>
+                </a:solidFill>
+                <a:latin typeface="Calibri" pitchFamily="34" charset="0"/>
+              </a:defRPr>
+            </a:lvl4pPr>
+            <a:lvl5pPr marL="2057400" indent="-228600" eaLnBrk="0" hangingPunct="0">
+              <a:spcBef>
+                <a:spcPct val="30000"/>
+              </a:spcBef>
+              <a:defRPr sz="1200">
+                <a:solidFill>
+                  <a:schemeClr val="tx1"/>
+                </a:solidFill>
+                <a:latin typeface="Calibri" pitchFamily="34" charset="0"/>
+              </a:defRPr>
+            </a:lvl5pPr>
+            <a:lvl6pPr marL="2514600" indent="-228600" eaLnBrk="0" fontAlgn="base" hangingPunct="0">
+              <a:spcBef>
+                <a:spcPct val="30000"/>
+              </a:spcBef>
+              <a:spcAft>
+                <a:spcPct val="0"/>
+              </a:spcAft>
+              <a:defRPr sz="1200">
+                <a:solidFill>
+                  <a:schemeClr val="tx1"/>
+                </a:solidFill>
+                <a:latin typeface="Calibri" pitchFamily="34" charset="0"/>
+              </a:defRPr>
+            </a:lvl6pPr>
+            <a:lvl7pPr marL="2971800" indent="-228600" eaLnBrk="0" fontAlgn="base" hangingPunct="0">
+              <a:spcBef>
+                <a:spcPct val="30000"/>
+              </a:spcBef>
+              <a:spcAft>
+                <a:spcPct val="0"/>
+              </a:spcAft>
+              <a:defRPr sz="1200">
+                <a:solidFill>
+                  <a:schemeClr val="tx1"/>
+                </a:solidFill>
+                <a:latin typeface="Calibri" pitchFamily="34" charset="0"/>
+              </a:defRPr>
+            </a:lvl7pPr>
+            <a:lvl8pPr marL="3429000" indent="-228600" eaLnBrk="0" fontAlgn="base" hangingPunct="0">
+              <a:spcBef>
+                <a:spcPct val="30000"/>
+              </a:spcBef>
+              <a:spcAft>
+                <a:spcPct val="0"/>
+              </a:spcAft>
+              <a:defRPr sz="1200">
+                <a:solidFill>
+                  <a:schemeClr val="tx1"/>
+                </a:solidFill>
+                <a:latin typeface="Calibri" pitchFamily="34" charset="0"/>
+              </a:defRPr>
+            </a:lvl8pPr>
+            <a:lvl9pPr marL="3886200" indent="-228600" eaLnBrk="0" fontAlgn="base" hangingPunct="0">
+              <a:spcBef>
+                <a:spcPct val="30000"/>
+              </a:spcBef>
+              <a:spcAft>
+                <a:spcPct val="0"/>
+              </a:spcAft>
+              <a:defRPr sz="1200">
+                <a:solidFill>
+                  <a:schemeClr val="tx1"/>
+                </a:solidFill>
+                <a:latin typeface="Calibri" pitchFamily="34" charset="0"/>
+              </a:defRPr>
+            </a:lvl9pPr>
+          </a:lstStyle>
+          <a:p>
+            <a:pPr>
+              <a:spcBef>
+                <a:spcPct val="0"/>
+              </a:spcBef>
+            </a:pPr>
+            <a:fld id="{65EA47BA-C6D2-42E1-B6C1-ABC893F7CB61}" type="slidenum">
+              <a:rPr lang="en-US" altLang="en-US" smtClean="0">
+                <a:latin typeface="Verdana" pitchFamily="34" charset="0"/>
+                <a:ea typeface="ＭＳ Ｐゴシック" pitchFamily="34" charset="-128"/>
+              </a:rPr>
+              <a:pPr>
+                <a:spcBef>
+                  <a:spcPct val="0"/>
+                </a:spcBef>
+              </a:pPr>
+              <a:t>24</a:t>
+            </a:fld>
+            <a:endParaRPr lang="en-US" altLang="en-US" smtClean="0">
+              <a:latin typeface="Verdana" pitchFamily="34" charset="0"/>
+              <a:ea typeface="ＭＳ Ｐゴシック" pitchFamily="34" charset="-128"/>
+            </a:endParaRPr>
+          </a:p>
+        </p:txBody>
+      </p:sp>
+    </p:spTree>
+  </p:cSld>
+  <p:clrMapOvr>
+    <a:masterClrMapping/>
+  </p:clrMapOvr>
+</p:notes>
+</file>
+
+<file path=ppt/notesSlides/notesSlide21.xml><?xml version="1.0" encoding="utf-8"?>
 <p:notes xmlns:a="http://schemas.openxmlformats.org/drawingml/2006/main" xmlns:r="http://schemas.openxmlformats.org/officeDocument/2006/relationships" xmlns:p="http://schemas.openxmlformats.org/presentationml/2006/main">
   <p:cSld>
     <p:spTree>
@@ -9091,7 +9257,7 @@
 </p:notes>
 </file>
 
-<file path=ppt/notesSlides/notesSlide21.xml><?xml version="1.0" encoding="utf-8"?>
+<file path=ppt/notesSlides/notesSlide22.xml><?xml version="1.0" encoding="utf-8"?>
 <p:notes xmlns:a="http://schemas.openxmlformats.org/drawingml/2006/main" xmlns:r="http://schemas.openxmlformats.org/officeDocument/2006/relationships" xmlns:p="http://schemas.openxmlformats.org/presentationml/2006/main">
   <p:cSld>
     <p:spTree>
@@ -9426,7 +9592,7 @@
 </p:notes>
 </file>
 
-<file path=ppt/notesSlides/notesSlide22.xml><?xml version="1.0" encoding="utf-8"?>
+<file path=ppt/notesSlides/notesSlide23.xml><?xml version="1.0" encoding="utf-8"?>
 <p:notes xmlns:a="http://schemas.openxmlformats.org/drawingml/2006/main" xmlns:r="http://schemas.openxmlformats.org/officeDocument/2006/relationships" xmlns:p="http://schemas.openxmlformats.org/presentationml/2006/main">
   <p:cSld>
     <p:spTree>
@@ -9734,7 +9900,7 @@
 </p:notes>
 </file>
 
-<file path=ppt/notesSlides/notesSlide23.xml><?xml version="1.0" encoding="utf-8"?>
+<file path=ppt/notesSlides/notesSlide24.xml><?xml version="1.0" encoding="utf-8"?>
 <p:notes xmlns:a="http://schemas.openxmlformats.org/drawingml/2006/main" xmlns:r="http://schemas.openxmlformats.org/officeDocument/2006/relationships" xmlns:p="http://schemas.openxmlformats.org/presentationml/2006/main">
   <p:cSld>
     <p:bg>
@@ -10300,340 +10466,6 @@
           <a:bodyPr/>
           <a:lstStyle/>
           <a:p>
-            <a:pPr marL="0" indent="0">
-              <a:buNone/>
-            </a:pPr>
-            <a:r>
-              <a:rPr lang="en-US" sz="1200" b="0" i="0" u="none" strike="noStrike" kern="1200" baseline="0" dirty="0" smtClean="0">
-                <a:solidFill>
-                  <a:schemeClr val="tx1"/>
-                </a:solidFill>
-                <a:latin typeface="+mn-lt"/>
-                <a:ea typeface="+mn-ea"/>
-                <a:cs typeface="+mn-cs"/>
-              </a:rPr>
-              <a:t>Teradata Unity Dictionary.</a:t>
-            </a:r>
-          </a:p>
-          <a:p>
-            <a:pPr marL="0" indent="0">
-              <a:buNone/>
-            </a:pPr>
-            <a:endParaRPr lang="en-US" sz="1200" b="0" i="0" u="none" strike="noStrike" kern="1200" baseline="0" dirty="0" smtClean="0">
-              <a:solidFill>
-                <a:schemeClr val="tx1"/>
-              </a:solidFill>
-              <a:latin typeface="+mn-lt"/>
-              <a:ea typeface="+mn-ea"/>
-              <a:cs typeface="+mn-cs"/>
-            </a:endParaRPr>
-          </a:p>
-          <a:p>
-            <a:pPr marL="0" indent="0">
-              <a:buNone/>
-            </a:pPr>
-            <a:r>
-              <a:rPr lang="en-US" sz="1200" b="0" i="0" u="none" strike="noStrike" kern="1200" baseline="0" dirty="0" smtClean="0">
-                <a:solidFill>
-                  <a:schemeClr val="tx1"/>
-                </a:solidFill>
-                <a:latin typeface="+mn-lt"/>
-                <a:ea typeface="+mn-ea"/>
-                <a:cs typeface="+mn-cs"/>
-              </a:rPr>
-              <a:t>The Unity Dictionary allows you to select database objects in a Managed Teradata Database system to manage with Unity. Unity uses Unity Dictionaries to determine session routing for database objects and to determine how locking rules are applied.</a:t>
-            </a:r>
-          </a:p>
-          <a:p>
-            <a:pPr marL="0" indent="0">
-              <a:buNone/>
-            </a:pPr>
-            <a:endParaRPr lang="en-US" sz="1200" b="0" i="0" u="none" strike="noStrike" kern="1200" baseline="0" dirty="0" smtClean="0">
-              <a:solidFill>
-                <a:schemeClr val="tx1"/>
-              </a:solidFill>
-              <a:latin typeface="+mn-lt"/>
-              <a:ea typeface="+mn-ea"/>
-              <a:cs typeface="+mn-cs"/>
-            </a:endParaRPr>
-          </a:p>
-          <a:p>
-            <a:pPr marL="0" indent="0">
-              <a:buNone/>
-            </a:pPr>
-            <a:r>
-              <a:rPr lang="en-US" sz="1200" b="0" i="0" u="none" strike="noStrike" kern="1200" baseline="0" dirty="0" smtClean="0">
-                <a:solidFill>
-                  <a:schemeClr val="tx1"/>
-                </a:solidFill>
-                <a:latin typeface="+mn-lt"/>
-                <a:ea typeface="+mn-ea"/>
-                <a:cs typeface="+mn-cs"/>
-              </a:rPr>
-              <a:t>You can select objects appropriate to the client application or users. You can create separate Unity Dictionaries for each client application and deploy these as needed in the Deployed Dictionary on each Unity server that manages the client application.</a:t>
-            </a:r>
-          </a:p>
-          <a:p>
-            <a:pPr marL="0" indent="0">
-              <a:buNone/>
-            </a:pPr>
-            <a:endParaRPr lang="en-US" sz="1200" b="0" i="0" u="none" strike="noStrike" kern="1200" baseline="0" dirty="0" smtClean="0">
-              <a:solidFill>
-                <a:schemeClr val="tx1"/>
-              </a:solidFill>
-              <a:latin typeface="+mn-lt"/>
-              <a:ea typeface="+mn-ea"/>
-              <a:cs typeface="+mn-cs"/>
-            </a:endParaRPr>
-          </a:p>
-          <a:p>
-            <a:pPr marL="0" indent="0">
-              <a:buNone/>
-            </a:pPr>
-            <a:r>
-              <a:rPr lang="en-US" sz="1200" b="0" i="0" u="none" strike="noStrike" kern="1200" baseline="0" dirty="0" smtClean="0">
-                <a:solidFill>
-                  <a:schemeClr val="tx1"/>
-                </a:solidFill>
-                <a:latin typeface="+mn-lt"/>
-                <a:ea typeface="+mn-ea"/>
-                <a:cs typeface="+mn-cs"/>
-              </a:rPr>
-              <a:t>The </a:t>
-            </a:r>
-            <a:r>
-              <a:rPr lang="en-US" sz="1200" b="1" i="0" u="none" strike="noStrike" kern="1200" baseline="0" dirty="0" smtClean="0">
-                <a:solidFill>
-                  <a:schemeClr val="tx1"/>
-                </a:solidFill>
-                <a:latin typeface="+mn-lt"/>
-                <a:ea typeface="+mn-ea"/>
-                <a:cs typeface="+mn-cs"/>
-              </a:rPr>
-              <a:t>Unity Configuration </a:t>
-            </a:r>
-            <a:r>
-              <a:rPr lang="en-US" sz="1200" b="0" i="0" u="none" strike="noStrike" kern="1200" baseline="0" dirty="0" smtClean="0">
-                <a:solidFill>
-                  <a:schemeClr val="tx1"/>
-                </a:solidFill>
-                <a:latin typeface="+mn-lt"/>
-                <a:ea typeface="+mn-ea"/>
-                <a:cs typeface="+mn-cs"/>
-              </a:rPr>
-              <a:t>portlet allows you to define a Dictionary and specify which database objects are included in the dictionary definition. After you deploy the Dictionary, Unity Director manages all objects in the Unity Dictionaries.</a:t>
-            </a:r>
-          </a:p>
-          <a:p>
-            <a:pPr marL="0" indent="0">
-              <a:buNone/>
-            </a:pPr>
-            <a:endParaRPr lang="en-US" sz="1200" b="0" i="0" u="none" strike="noStrike" kern="1200" baseline="0" dirty="0" smtClean="0">
-              <a:solidFill>
-                <a:schemeClr val="tx1"/>
-              </a:solidFill>
-              <a:latin typeface="+mn-lt"/>
-              <a:ea typeface="+mn-ea"/>
-              <a:cs typeface="+mn-cs"/>
-            </a:endParaRPr>
-          </a:p>
-          <a:p>
-            <a:pPr marL="0" indent="0">
-              <a:buNone/>
-            </a:pPr>
-            <a:r>
-              <a:rPr lang="en-US" sz="1200" b="0" i="0" u="none" strike="noStrike" kern="1200" baseline="0" dirty="0" smtClean="0">
-                <a:solidFill>
-                  <a:schemeClr val="tx1"/>
-                </a:solidFill>
-                <a:latin typeface="+mn-lt"/>
-                <a:ea typeface="+mn-ea"/>
-                <a:cs typeface="+mn-cs"/>
-              </a:rPr>
-              <a:t>Animate(1)</a:t>
-            </a:r>
-          </a:p>
-          <a:p>
-            <a:pPr marL="0" indent="0">
-              <a:buNone/>
-            </a:pPr>
-            <a:r>
-              <a:rPr lang="en-US" sz="1200" b="0" i="0" u="none" strike="noStrike" kern="1200" baseline="0" dirty="0" smtClean="0">
-                <a:solidFill>
-                  <a:schemeClr val="tx1"/>
-                </a:solidFill>
-                <a:latin typeface="+mn-lt"/>
-                <a:ea typeface="+mn-ea"/>
-                <a:cs typeface="+mn-cs"/>
-              </a:rPr>
-              <a:t>	Create a new Unity Dictionary from the Unity Configuration portlet, click on the tab </a:t>
-            </a:r>
-            <a:r>
-              <a:rPr lang="en-US" sz="1200" b="1" i="0" u="none" strike="noStrike" kern="1200" baseline="0" dirty="0" smtClean="0">
-                <a:solidFill>
-                  <a:schemeClr val="tx1"/>
-                </a:solidFill>
-                <a:latin typeface="+mn-lt"/>
-                <a:ea typeface="+mn-ea"/>
-                <a:cs typeface="+mn-cs"/>
-              </a:rPr>
-              <a:t>Working Dictionaries</a:t>
-            </a:r>
-            <a:r>
-              <a:rPr lang="en-US" sz="1200" b="0" i="0" u="none" strike="noStrike" kern="1200" baseline="0" dirty="0" smtClean="0">
-                <a:solidFill>
-                  <a:schemeClr val="tx1"/>
-                </a:solidFill>
-                <a:latin typeface="+mn-lt"/>
-                <a:ea typeface="+mn-ea"/>
-                <a:cs typeface="+mn-cs"/>
-              </a:rPr>
-              <a:t>. This tab holds references to all unity dictionaries that have been created.</a:t>
-            </a:r>
-          </a:p>
-          <a:p>
-            <a:pPr marL="0" marR="0" indent="0" algn="l" defTabSz="914400" rtl="0" eaLnBrk="1" fontAlgn="auto" latinLnBrk="0" hangingPunct="1">
-              <a:lnSpc>
-                <a:spcPct val="95000"/>
-              </a:lnSpc>
-              <a:spcBef>
-                <a:spcPts val="400"/>
-              </a:spcBef>
-              <a:spcAft>
-                <a:spcPts val="0"/>
-              </a:spcAft>
-              <a:buClrTx/>
-              <a:buSzTx/>
-              <a:buFont typeface="Arial" panose="020B0604020202020204" pitchFamily="34" charset="0"/>
-              <a:buNone/>
-              <a:tabLst/>
-              <a:defRPr/>
-            </a:pPr>
-            <a:r>
-              <a:rPr lang="en-US" sz="1200" b="0" i="0" u="none" strike="noStrike" kern="1200" baseline="0" dirty="0" smtClean="0">
-                <a:solidFill>
-                  <a:schemeClr val="tx1"/>
-                </a:solidFill>
-                <a:latin typeface="+mn-lt"/>
-                <a:ea typeface="+mn-ea"/>
-                <a:cs typeface="+mn-cs"/>
-              </a:rPr>
-              <a:t>Animate(2)</a:t>
-            </a:r>
-          </a:p>
-          <a:p>
-            <a:pPr marL="0" indent="0">
-              <a:buNone/>
-            </a:pPr>
-            <a:r>
-              <a:rPr lang="en-US" sz="1200" b="0" i="0" u="none" strike="noStrike" kern="1200" baseline="0" dirty="0" smtClean="0">
-                <a:solidFill>
-                  <a:schemeClr val="tx1"/>
-                </a:solidFill>
-                <a:latin typeface="+mn-lt"/>
-                <a:ea typeface="+mn-ea"/>
-                <a:cs typeface="+mn-cs"/>
-              </a:rPr>
-              <a:t>	Create a new Dictionary with a click on the ‘+’</a:t>
-            </a:r>
-          </a:p>
-          <a:p>
-            <a:pPr marL="0" indent="0">
-              <a:buNone/>
-            </a:pPr>
-            <a:r>
-              <a:rPr lang="en-US" sz="1200" b="0" i="0" u="none" strike="noStrike" kern="1200" baseline="0" dirty="0" smtClean="0">
-                <a:solidFill>
-                  <a:schemeClr val="tx1"/>
-                </a:solidFill>
-                <a:latin typeface="+mn-lt"/>
-                <a:ea typeface="+mn-ea"/>
-                <a:cs typeface="+mn-cs"/>
-              </a:rPr>
-              <a:t>Animate(3)</a:t>
-            </a:r>
-          </a:p>
-          <a:p>
-            <a:pPr marL="0" indent="0">
-              <a:buNone/>
-            </a:pPr>
-            <a:r>
-              <a:rPr lang="en-US" sz="1200" b="0" i="0" u="none" strike="noStrike" kern="1200" baseline="0" dirty="0" smtClean="0">
-                <a:solidFill>
-                  <a:schemeClr val="tx1"/>
-                </a:solidFill>
-                <a:latin typeface="+mn-lt"/>
-                <a:ea typeface="+mn-ea"/>
-                <a:cs typeface="+mn-cs"/>
-              </a:rPr>
-              <a:t>	Define the Name to use for this Unity Dictionary, meaningful dictionary names can be of help later when investigating object location and settings.</a:t>
-            </a:r>
-          </a:p>
-          <a:p>
-            <a:pPr marL="0" indent="0">
-              <a:buNone/>
-            </a:pPr>
-            <a:r>
-              <a:rPr lang="en-US" sz="1200" b="0" i="0" u="none" strike="noStrike" kern="1200" baseline="0" dirty="0" smtClean="0">
-                <a:solidFill>
-                  <a:schemeClr val="tx1"/>
-                </a:solidFill>
-                <a:latin typeface="+mn-lt"/>
-                <a:ea typeface="+mn-ea"/>
-                <a:cs typeface="+mn-cs"/>
-              </a:rPr>
-              <a:t>Animate(4)</a:t>
-            </a:r>
-          </a:p>
-          <a:p>
-            <a:pPr marL="0" indent="0">
-              <a:buNone/>
-            </a:pPr>
-            <a:r>
-              <a:rPr lang="en-US" sz="1200" b="0" i="0" u="none" strike="noStrike" kern="1200" baseline="0" dirty="0" smtClean="0">
-                <a:solidFill>
-                  <a:schemeClr val="tx1"/>
-                </a:solidFill>
-                <a:latin typeface="+mn-lt"/>
-                <a:ea typeface="+mn-ea"/>
-                <a:cs typeface="+mn-cs"/>
-              </a:rPr>
-              <a:t>	To start the Scan of the Managed Teradata systems click on </a:t>
-            </a:r>
-            <a:r>
-              <a:rPr lang="en-US" sz="1200" b="1" i="0" u="none" strike="noStrike" kern="1200" baseline="0" dirty="0" smtClean="0">
-                <a:solidFill>
-                  <a:schemeClr val="tx1"/>
-                </a:solidFill>
-                <a:latin typeface="+mn-lt"/>
-                <a:ea typeface="+mn-ea"/>
-                <a:cs typeface="+mn-cs"/>
-              </a:rPr>
-              <a:t>Scan</a:t>
-            </a:r>
-            <a:r>
-              <a:rPr lang="en-US" sz="1200" b="0" i="0" u="none" strike="noStrike" kern="1200" baseline="0" dirty="0" smtClean="0">
-                <a:solidFill>
-                  <a:schemeClr val="tx1"/>
-                </a:solidFill>
-                <a:latin typeface="+mn-lt"/>
-                <a:ea typeface="+mn-ea"/>
-                <a:cs typeface="+mn-cs"/>
-              </a:rPr>
-              <a:t> at the bottom of the screen.</a:t>
-            </a:r>
-          </a:p>
-          <a:p>
-            <a:endParaRPr lang="en-US" sz="1200" b="0" i="0" u="none" strike="noStrike" kern="1200" baseline="0" dirty="0" smtClean="0">
-              <a:solidFill>
-                <a:schemeClr val="tx1"/>
-              </a:solidFill>
-              <a:latin typeface="+mn-lt"/>
-              <a:ea typeface="+mn-ea"/>
-              <a:cs typeface="+mn-cs"/>
-            </a:endParaRPr>
-          </a:p>
-          <a:p>
             <a:endParaRPr lang="en-US" sz="1200" b="0" i="0" u="none" strike="noStrike" kern="1200" baseline="0" dirty="0" smtClean="0">
               <a:solidFill>
                 <a:schemeClr val="tx1"/>
@@ -10661,10 +10493,10 @@
           <a:lstStyle/>
           <a:p>
             <a:r>
-              <a:rPr lang="en-US" dirty="0" smtClean="0"/>
+              <a:rPr lang="en-US" smtClean="0"/>
               <a:t>© 2014 Teradata</a:t>
             </a:r>
-            <a:endParaRPr lang="en-US" dirty="0"/>
+            <a:endParaRPr lang="en-US"/>
           </a:p>
         </p:txBody>
       </p:sp>
@@ -10725,150 +10557,348 @@
           <a:bodyPr/>
           <a:lstStyle/>
           <a:p>
-            <a:pPr>
-              <a:lnSpc>
-                <a:spcPct val="90000"/>
-              </a:lnSpc>
-            </a:pPr>
-            <a:r>
-              <a:rPr lang="en-US" dirty="0" smtClean="0"/>
-              <a:t>Data movement is bi-directional in all scenarios. One thing to note is that currently Teradata must be either a source or a destination in Aster and Hadoop data movements. No Aster/Aster, Hadoop/Hadoop or Aster/Hadoop moves</a:t>
-            </a:r>
-            <a:r>
-              <a:rPr lang="en-US" baseline="0" dirty="0" smtClean="0"/>
-              <a:t> at this time.</a:t>
-            </a:r>
-            <a:r>
-              <a:rPr lang="en-US" dirty="0" smtClean="0"/>
-              <a:t/>
-            </a:r>
-            <a:br>
-              <a:rPr lang="en-US" dirty="0" smtClean="0"/>
-            </a:br>
-            <a:endParaRPr lang="en-US" dirty="0" smtClean="0"/>
-          </a:p>
-          <a:p>
-            <a:pPr>
-              <a:lnSpc>
-                <a:spcPct val="90000"/>
-              </a:lnSpc>
-            </a:pPr>
-            <a:r>
-              <a:rPr lang="en-US" dirty="0" smtClean="0"/>
-              <a:t>Data movement can be periodic,</a:t>
-            </a:r>
-            <a:r>
-              <a:rPr lang="en-US" baseline="0" dirty="0" smtClean="0"/>
-              <a:t> driven by an external trigger, or ad-hoc via the Viewpoint portlet interface. Ad-hoc data movement is typically done by </a:t>
-            </a:r>
-            <a:r>
-              <a:rPr lang="en-US" baseline="0" dirty="0" err="1" smtClean="0"/>
-              <a:t>dba’s</a:t>
-            </a:r>
-            <a:r>
-              <a:rPr lang="en-US" baseline="0" dirty="0" smtClean="0"/>
-              <a:t> doing maintenance within the environment or seeding Test and QA systems.</a:t>
-            </a:r>
-          </a:p>
-          <a:p>
             <a:pPr marL="0" indent="0">
-              <a:lnSpc>
-                <a:spcPct val="90000"/>
-              </a:lnSpc>
               <a:buNone/>
             </a:pPr>
-            <a:endParaRPr lang="en-US" dirty="0" smtClean="0"/>
-          </a:p>
-          <a:p>
-            <a:pPr>
+            <a:r>
+              <a:rPr lang="en-US" sz="1200" b="0" i="0" u="none" strike="noStrike" kern="1200" baseline="0" dirty="0" smtClean="0">
+                <a:solidFill>
+                  <a:schemeClr val="tx1"/>
+                </a:solidFill>
+                <a:latin typeface="+mn-lt"/>
+                <a:ea typeface="+mn-ea"/>
+                <a:cs typeface="+mn-cs"/>
+              </a:rPr>
+              <a:t>Teradata Unity Dictionary.</a:t>
+            </a:r>
+          </a:p>
+          <a:p>
+            <a:pPr marL="0" indent="0">
+              <a:buNone/>
+            </a:pPr>
+            <a:endParaRPr lang="en-US" sz="1200" b="0" i="0" u="none" strike="noStrike" kern="1200" baseline="0" dirty="0" smtClean="0">
+              <a:solidFill>
+                <a:schemeClr val="tx1"/>
+              </a:solidFill>
+              <a:latin typeface="+mn-lt"/>
+              <a:ea typeface="+mn-ea"/>
+              <a:cs typeface="+mn-cs"/>
+            </a:endParaRPr>
+          </a:p>
+          <a:p>
+            <a:pPr marL="0" indent="0">
+              <a:buNone/>
+            </a:pPr>
+            <a:r>
+              <a:rPr lang="en-US" sz="1200" b="0" i="0" u="none" strike="noStrike" kern="1200" baseline="0" dirty="0" smtClean="0">
+                <a:solidFill>
+                  <a:schemeClr val="tx1"/>
+                </a:solidFill>
+                <a:latin typeface="+mn-lt"/>
+                <a:ea typeface="+mn-ea"/>
+                <a:cs typeface="+mn-cs"/>
+              </a:rPr>
+              <a:t>The Unity Dictionary allows you to select database objects in a Managed Teradata Database system to manage with Unity. Unity uses Unity Dictionaries to determine session routing for database objects and to determine how locking rules are applied.</a:t>
+            </a:r>
+          </a:p>
+          <a:p>
+            <a:pPr marL="0" indent="0">
+              <a:buNone/>
+            </a:pPr>
+            <a:endParaRPr lang="en-US" sz="1200" b="0" i="0" u="none" strike="noStrike" kern="1200" baseline="0" dirty="0" smtClean="0">
+              <a:solidFill>
+                <a:schemeClr val="tx1"/>
+              </a:solidFill>
+              <a:latin typeface="+mn-lt"/>
+              <a:ea typeface="+mn-ea"/>
+              <a:cs typeface="+mn-cs"/>
+            </a:endParaRPr>
+          </a:p>
+          <a:p>
+            <a:pPr marL="0" indent="0">
+              <a:buNone/>
+            </a:pPr>
+            <a:r>
+              <a:rPr lang="en-US" sz="1200" b="0" i="0" u="none" strike="noStrike" kern="1200" baseline="0" dirty="0" smtClean="0">
+                <a:solidFill>
+                  <a:schemeClr val="tx1"/>
+                </a:solidFill>
+                <a:latin typeface="+mn-lt"/>
+                <a:ea typeface="+mn-ea"/>
+                <a:cs typeface="+mn-cs"/>
+              </a:rPr>
+              <a:t>You can select objects appropriate to the client application or users. You can create separate Unity Dictionaries for each client application and deploy these as needed in the Deployed Dictionary on each Unity server that manages the client application.</a:t>
+            </a:r>
+          </a:p>
+          <a:p>
+            <a:pPr marL="0" indent="0">
+              <a:buNone/>
+            </a:pPr>
+            <a:endParaRPr lang="en-US" sz="1200" b="0" i="0" u="none" strike="noStrike" kern="1200" baseline="0" dirty="0" smtClean="0">
+              <a:solidFill>
+                <a:schemeClr val="tx1"/>
+              </a:solidFill>
+              <a:latin typeface="+mn-lt"/>
+              <a:ea typeface="+mn-ea"/>
+              <a:cs typeface="+mn-cs"/>
+            </a:endParaRPr>
+          </a:p>
+          <a:p>
+            <a:pPr marL="0" indent="0">
+              <a:buNone/>
+            </a:pPr>
+            <a:r>
+              <a:rPr lang="en-US" sz="1200" b="0" i="0" u="none" strike="noStrike" kern="1200" baseline="0" dirty="0" smtClean="0">
+                <a:solidFill>
+                  <a:schemeClr val="tx1"/>
+                </a:solidFill>
+                <a:latin typeface="+mn-lt"/>
+                <a:ea typeface="+mn-ea"/>
+                <a:cs typeface="+mn-cs"/>
+              </a:rPr>
+              <a:t>The </a:t>
+            </a:r>
+            <a:r>
+              <a:rPr lang="en-US" sz="1200" b="1" i="0" u="none" strike="noStrike" kern="1200" baseline="0" dirty="0" smtClean="0">
+                <a:solidFill>
+                  <a:schemeClr val="tx1"/>
+                </a:solidFill>
+                <a:latin typeface="+mn-lt"/>
+                <a:ea typeface="+mn-ea"/>
+                <a:cs typeface="+mn-cs"/>
+              </a:rPr>
+              <a:t>Unity Configuration </a:t>
+            </a:r>
+            <a:r>
+              <a:rPr lang="en-US" sz="1200" b="0" i="0" u="none" strike="noStrike" kern="1200" baseline="0" dirty="0" smtClean="0">
+                <a:solidFill>
+                  <a:schemeClr val="tx1"/>
+                </a:solidFill>
+                <a:latin typeface="+mn-lt"/>
+                <a:ea typeface="+mn-ea"/>
+                <a:cs typeface="+mn-cs"/>
+              </a:rPr>
+              <a:t>portlet allows you to define a Dictionary and specify which database objects are included in the dictionary definition. After you deploy the Dictionary, Unity Director manages all objects in the Unity Dictionaries.</a:t>
+            </a:r>
+          </a:p>
+          <a:p>
+            <a:pPr marL="0" indent="0">
+              <a:buNone/>
+            </a:pPr>
+            <a:endParaRPr lang="en-US" sz="1200" b="0" i="0" u="none" strike="noStrike" kern="1200" baseline="0" dirty="0" smtClean="0">
+              <a:solidFill>
+                <a:schemeClr val="tx1"/>
+              </a:solidFill>
+              <a:latin typeface="+mn-lt"/>
+              <a:ea typeface="+mn-ea"/>
+              <a:cs typeface="+mn-cs"/>
+            </a:endParaRPr>
+          </a:p>
+          <a:p>
+            <a:pPr marL="0" indent="0">
+              <a:buNone/>
+            </a:pPr>
+            <a:r>
+              <a:rPr lang="en-US" sz="1200" b="0" i="0" u="none" strike="noStrike" kern="1200" baseline="0" dirty="0" smtClean="0">
+                <a:solidFill>
+                  <a:schemeClr val="tx1"/>
+                </a:solidFill>
+                <a:latin typeface="+mn-lt"/>
+                <a:ea typeface="+mn-ea"/>
+                <a:cs typeface="+mn-cs"/>
+              </a:rPr>
+              <a:t>Animate(1)</a:t>
+            </a:r>
+          </a:p>
+          <a:p>
+            <a:pPr marL="0" indent="0">
+              <a:buNone/>
+            </a:pPr>
+            <a:r>
+              <a:rPr lang="en-US" sz="1200" b="0" i="0" u="none" strike="noStrike" kern="1200" baseline="0" dirty="0" smtClean="0">
+                <a:solidFill>
+                  <a:schemeClr val="tx1"/>
+                </a:solidFill>
+                <a:latin typeface="+mn-lt"/>
+                <a:ea typeface="+mn-ea"/>
+                <a:cs typeface="+mn-cs"/>
+              </a:rPr>
+              <a:t>	Create a new Unity Dictionary from the Unity Configuration portlet, click on the tab </a:t>
+            </a:r>
+            <a:r>
+              <a:rPr lang="en-US" sz="1200" b="1" i="0" u="none" strike="noStrike" kern="1200" baseline="0" dirty="0" smtClean="0">
+                <a:solidFill>
+                  <a:schemeClr val="tx1"/>
+                </a:solidFill>
+                <a:latin typeface="+mn-lt"/>
+                <a:ea typeface="+mn-ea"/>
+                <a:cs typeface="+mn-cs"/>
+              </a:rPr>
+              <a:t>Working Dictionaries</a:t>
+            </a:r>
+            <a:r>
+              <a:rPr lang="en-US" sz="1200" b="0" i="0" u="none" strike="noStrike" kern="1200" baseline="0" dirty="0" smtClean="0">
+                <a:solidFill>
+                  <a:schemeClr val="tx1"/>
+                </a:solidFill>
+                <a:latin typeface="+mn-lt"/>
+                <a:ea typeface="+mn-ea"/>
+                <a:cs typeface="+mn-cs"/>
+              </a:rPr>
+              <a:t>. This tab holds references to all unity dictionaries that have been created.</a:t>
+            </a:r>
+          </a:p>
+          <a:p>
+            <a:pPr marL="0" marR="0" indent="0" algn="l" defTabSz="914400" rtl="0" eaLnBrk="1" fontAlgn="auto" latinLnBrk="0" hangingPunct="1">
               <a:lnSpc>
-                <a:spcPct val="90000"/>
+                <a:spcPct val="95000"/>
               </a:lnSpc>
-            </a:pPr>
-            <a:r>
-              <a:rPr lang="en-US" dirty="0" smtClean="0"/>
-              <a:t>Data Mover</a:t>
-            </a:r>
-            <a:r>
-              <a:rPr lang="en-US" baseline="0" dirty="0" smtClean="0"/>
-              <a:t> intelligently chooses the best method to copy data between Teradata systems dynamically.  It lets administrators concentrate on what they want to accomplish rather than how, allowing administrators enter the data copy intent while Data Mover determines the best method to copy the data.  </a:t>
-            </a:r>
-            <a:endParaRPr lang="en-US" dirty="0" smtClean="0"/>
-          </a:p>
-          <a:p>
-            <a:pPr>
-              <a:lnSpc>
-                <a:spcPct val="90000"/>
-              </a:lnSpc>
-            </a:pPr>
-            <a:endParaRPr lang="en-US" dirty="0" smtClean="0"/>
-          </a:p>
-          <a:p>
-            <a:pPr marL="173033" indent="-173033" defTabSz="914372" fontAlgn="base">
-              <a:lnSpc>
-                <a:spcPct val="90000"/>
-              </a:lnSpc>
-              <a:spcBef>
-                <a:spcPct val="30000"/>
+              <a:spcBef>
+                <a:spcPts val="400"/>
               </a:spcBef>
               <a:spcAft>
-                <a:spcPct val="0"/>
+                <a:spcPts val="0"/>
               </a:spcAft>
+              <a:buClrTx/>
+              <a:buSzTx/>
+              <a:buFont typeface="Arial" panose="020B0604020202020204" pitchFamily="34" charset="0"/>
+              <a:buNone/>
+              <a:tabLst/>
               <a:defRPr/>
             </a:pPr>
             <a:r>
-              <a:rPr lang="en-US" dirty="0" smtClean="0"/>
-              <a:t>Data Mover can</a:t>
-            </a:r>
-            <a:r>
-              <a:rPr lang="en-US" baseline="0" dirty="0" smtClean="0"/>
-              <a:t> do full or partial table copies. To do a partial table copy a “where-clause” is given to Data Mover to grab only those rows that have been updated. To do that the table must be instrumented with a time-stamp or other indicator that a row has changed for Data Mover to be able to extract that row via the “where-clause”.</a:t>
-            </a:r>
-            <a:br>
-              <a:rPr lang="en-US" baseline="0" dirty="0" smtClean="0"/>
-            </a:br>
-            <a:endParaRPr lang="en-US" dirty="0" smtClean="0"/>
-          </a:p>
-          <a:p>
-            <a:pPr>
-              <a:lnSpc>
-                <a:spcPct val="90000"/>
-              </a:lnSpc>
+              <a:rPr lang="en-US" sz="1200" b="0" i="0" u="none" strike="noStrike" kern="1200" baseline="0" dirty="0" smtClean="0">
+                <a:solidFill>
+                  <a:schemeClr val="tx1"/>
+                </a:solidFill>
+                <a:latin typeface="+mn-lt"/>
+                <a:ea typeface="+mn-ea"/>
+                <a:cs typeface="+mn-cs"/>
+              </a:rPr>
+              <a:t>Animate(2)</a:t>
+            </a:r>
+          </a:p>
+          <a:p>
+            <a:pPr marL="0" indent="0">
+              <a:buNone/>
             </a:pPr>
             <a:r>
-              <a:rPr lang="en-US" dirty="0" smtClean="0"/>
-              <a:t>Uses existing Teradata Utilities</a:t>
-            </a:r>
-          </a:p>
-          <a:p>
-            <a:pPr>
-              <a:lnSpc>
-                <a:spcPct val="90000"/>
-              </a:lnSpc>
+              <a:rPr lang="en-US" sz="1200" b="0" i="0" u="none" strike="noStrike" kern="1200" baseline="0" dirty="0" smtClean="0">
+                <a:solidFill>
+                  <a:schemeClr val="tx1"/>
+                </a:solidFill>
+                <a:latin typeface="+mn-lt"/>
+                <a:ea typeface="+mn-ea"/>
+                <a:cs typeface="+mn-cs"/>
+              </a:rPr>
+              <a:t>	Create a new Dictionary with a click on the ‘+’</a:t>
+            </a:r>
+          </a:p>
+          <a:p>
+            <a:pPr marL="0" indent="0">
+              <a:buNone/>
             </a:pPr>
             <a:r>
-              <a:rPr lang="en-US" dirty="0" smtClean="0"/>
-              <a:t>Uses ARC if a full table, this is the fastest.  If not, will use load/unload; </a:t>
-            </a:r>
-            <a:r>
-              <a:rPr lang="en-US" dirty="0" err="1" smtClean="0"/>
-              <a:t>fastload</a:t>
-            </a:r>
-            <a:r>
-              <a:rPr lang="en-US" dirty="0" smtClean="0"/>
-              <a:t> if empty table. </a:t>
-            </a:r>
-          </a:p>
-          <a:p>
-            <a:pPr>
-              <a:lnSpc>
-                <a:spcPct val="90000"/>
-              </a:lnSpc>
+              <a:rPr lang="en-US" sz="1200" b="0" i="0" u="none" strike="noStrike" kern="1200" baseline="0" dirty="0" smtClean="0">
+                <a:solidFill>
+                  <a:schemeClr val="tx1"/>
+                </a:solidFill>
+                <a:latin typeface="+mn-lt"/>
+                <a:ea typeface="+mn-ea"/>
+                <a:cs typeface="+mn-cs"/>
+              </a:rPr>
+              <a:t>Animate(3)</a:t>
+            </a:r>
+          </a:p>
+          <a:p>
+            <a:pPr marL="0" indent="0">
+              <a:buNone/>
             </a:pPr>
-            <a:endParaRPr lang="en-US" dirty="0" smtClean="0"/>
-          </a:p>
-          <a:p>
-            <a:endParaRPr lang="en-US" dirty="0"/>
+            <a:r>
+              <a:rPr lang="en-US" sz="1200" b="0" i="0" u="none" strike="noStrike" kern="1200" baseline="0" dirty="0" smtClean="0">
+                <a:solidFill>
+                  <a:schemeClr val="tx1"/>
+                </a:solidFill>
+                <a:latin typeface="+mn-lt"/>
+                <a:ea typeface="+mn-ea"/>
+                <a:cs typeface="+mn-cs"/>
+              </a:rPr>
+              <a:t>	Define the Name to use for this Unity Dictionary, meaningful dictionary names can be of help later when investigating object location and settings.</a:t>
+            </a:r>
+          </a:p>
+          <a:p>
+            <a:pPr marL="0" indent="0">
+              <a:buNone/>
+            </a:pPr>
+            <a:r>
+              <a:rPr lang="en-US" sz="1200" b="0" i="0" u="none" strike="noStrike" kern="1200" baseline="0" dirty="0" smtClean="0">
+                <a:solidFill>
+                  <a:schemeClr val="tx1"/>
+                </a:solidFill>
+                <a:latin typeface="+mn-lt"/>
+                <a:ea typeface="+mn-ea"/>
+                <a:cs typeface="+mn-cs"/>
+              </a:rPr>
+              <a:t>Animate(4)</a:t>
+            </a:r>
+          </a:p>
+          <a:p>
+            <a:pPr marL="0" indent="0">
+              <a:buNone/>
+            </a:pPr>
+            <a:r>
+              <a:rPr lang="en-US" sz="1200" b="0" i="0" u="none" strike="noStrike" kern="1200" baseline="0" dirty="0" smtClean="0">
+                <a:solidFill>
+                  <a:schemeClr val="tx1"/>
+                </a:solidFill>
+                <a:latin typeface="+mn-lt"/>
+                <a:ea typeface="+mn-ea"/>
+                <a:cs typeface="+mn-cs"/>
+              </a:rPr>
+              <a:t>	To start the Scan of the Managed Teradata systems click on </a:t>
+            </a:r>
+            <a:r>
+              <a:rPr lang="en-US" sz="1200" b="1" i="0" u="none" strike="noStrike" kern="1200" baseline="0" dirty="0" smtClean="0">
+                <a:solidFill>
+                  <a:schemeClr val="tx1"/>
+                </a:solidFill>
+                <a:latin typeface="+mn-lt"/>
+                <a:ea typeface="+mn-ea"/>
+                <a:cs typeface="+mn-cs"/>
+              </a:rPr>
+              <a:t>Scan</a:t>
+            </a:r>
+            <a:r>
+              <a:rPr lang="en-US" sz="1200" b="0" i="0" u="none" strike="noStrike" kern="1200" baseline="0" dirty="0" smtClean="0">
+                <a:solidFill>
+                  <a:schemeClr val="tx1"/>
+                </a:solidFill>
+                <a:latin typeface="+mn-lt"/>
+                <a:ea typeface="+mn-ea"/>
+                <a:cs typeface="+mn-cs"/>
+              </a:rPr>
+              <a:t> at the bottom of the screen.</a:t>
+            </a:r>
+          </a:p>
+          <a:p>
+            <a:endParaRPr lang="en-US" sz="1200" b="0" i="0" u="none" strike="noStrike" kern="1200" baseline="0" dirty="0" smtClean="0">
+              <a:solidFill>
+                <a:schemeClr val="tx1"/>
+              </a:solidFill>
+              <a:latin typeface="+mn-lt"/>
+              <a:ea typeface="+mn-ea"/>
+              <a:cs typeface="+mn-cs"/>
+            </a:endParaRPr>
+          </a:p>
+          <a:p>
+            <a:endParaRPr lang="en-US" sz="1200" b="0" i="0" u="none" strike="noStrike" kern="1200" baseline="0" dirty="0" smtClean="0">
+              <a:solidFill>
+                <a:schemeClr val="tx1"/>
+              </a:solidFill>
+              <a:latin typeface="+mn-lt"/>
+              <a:ea typeface="+mn-ea"/>
+              <a:cs typeface="+mn-cs"/>
+            </a:endParaRPr>
           </a:p>
         </p:txBody>
       </p:sp>
@@ -10888,17 +10918,17 @@
           <a:lstStyle/>
           <a:p>
             <a:r>
-              <a:rPr lang="en-US" smtClean="0"/>
+              <a:rPr lang="en-US" dirty="0" smtClean="0"/>
               <a:t>© 2014 Teradata</a:t>
             </a:r>
-            <a:endParaRPr lang="en-US"/>
+            <a:endParaRPr lang="en-US" dirty="0"/>
           </a:p>
         </p:txBody>
       </p:sp>
     </p:spTree>
     <p:extLst>
       <p:ext uri="{BB962C8B-B14F-4D97-AF65-F5344CB8AC3E}">
-        <p14:creationId xmlns:p14="http://schemas.microsoft.com/office/powerpoint/2010/main" val="2920082167"/>
+        <p14:creationId xmlns:p14="http://schemas.microsoft.com/office/powerpoint/2010/main" val="3650013572"/>
       </p:ext>
     </p:extLst>
   </p:cSld>
@@ -10952,21 +10982,22 @@
           <a:bodyPr/>
           <a:lstStyle/>
           <a:p>
-            <a:pPr marL="0" indent="0">
-              <a:buNone/>
+            <a:pPr>
+              <a:lnSpc>
+                <a:spcPct val="90000"/>
+              </a:lnSpc>
             </a:pPr>
             <a:r>
               <a:rPr lang="en-US" dirty="0" smtClean="0"/>
-              <a:t>This chart shows the Data Mover architecture.</a:t>
-            </a:r>
-          </a:p>
-          <a:p>
-            <a:endParaRPr lang="en-US" dirty="0" smtClean="0"/>
-          </a:p>
-          <a:p>
+              <a:t>Data movement is bi-directional in all scenarios. One thing to note is that currently Teradata must be either a source or a destination in Aster and Hadoop data movements. No Aster/Aster, Hadoop/Hadoop or Aster/Hadoop moves</a:t>
+            </a:r>
+            <a:r>
+              <a:rPr lang="en-US" baseline="0" dirty="0" smtClean="0"/>
+              <a:t> at this time.</a:t>
+            </a:r>
             <a:r>
               <a:rPr lang="en-US" dirty="0" smtClean="0"/>
-              <a:t>Starting from the top:</a:t>
+              <a:t/>
             </a:r>
             <a:br>
               <a:rPr lang="en-US" dirty="0" smtClean="0"/>
@@ -10974,105 +11005,157 @@
             <a:endParaRPr lang="en-US" dirty="0" smtClean="0"/>
           </a:p>
           <a:p>
-            <a:pPr marL="685757" lvl="1" indent="-228586">
-              <a:buFont typeface="+mj-lt"/>
-              <a:buAutoNum type="arabicPeriod"/>
+            <a:pPr>
+              <a:lnSpc>
+                <a:spcPct val="90000"/>
+              </a:lnSpc>
             </a:pPr>
             <a:r>
               <a:rPr lang="en-US" dirty="0" smtClean="0"/>
-              <a:t>The</a:t>
+              <a:t>Data movement can be periodic,</a:t>
             </a:r>
             <a:r>
               <a:rPr lang="en-US" baseline="0" dirty="0" smtClean="0"/>
-              <a:t> user’s intent is entered either via the Viewpoint portlet or the Command Line Interface.</a:t>
-            </a:r>
-          </a:p>
-          <a:p>
-            <a:pPr marL="685757" lvl="1" indent="-228586">
-              <a:buFont typeface="+mj-lt"/>
-              <a:buAutoNum type="arabicPeriod"/>
-            </a:pPr>
+              <a:t> driven by an external trigger, or ad-hoc via the Viewpoint portlet interface. Ad-hoc data movement is typically done by </a:t>
+            </a:r>
+            <a:r>
+              <a:rPr lang="en-US" baseline="0" dirty="0" err="1" smtClean="0"/>
+              <a:t>dba’s</a:t>
+            </a:r>
             <a:r>
               <a:rPr lang="en-US" baseline="0" dirty="0" smtClean="0"/>
-              <a:t>The Data Mover Daemon takes that intent and turns it into a Data Mover job.</a:t>
-            </a:r>
-          </a:p>
-          <a:p>
-            <a:pPr marL="685757" lvl="1" indent="-228586">
-              <a:buFont typeface="+mj-lt"/>
-              <a:buAutoNum type="arabicPeriod"/>
-            </a:pPr>
-            <a:r>
-              <a:rPr lang="en-US" dirty="0" smtClean="0"/>
-              <a:t>The Data Mover job is then passed to the Data Mover Agent for execution.</a:t>
-            </a:r>
-          </a:p>
-          <a:p>
-            <a:pPr marL="685757" lvl="1" indent="-228586">
-              <a:buFont typeface="+mj-lt"/>
-              <a:buAutoNum type="arabicPeriod"/>
+              <a:t> doing maintenance within the environment or seeding Test and QA systems.</a:t>
+            </a:r>
+          </a:p>
+          <a:p>
+            <a:pPr marL="0" indent="0">
+              <a:lnSpc>
+                <a:spcPct val="90000"/>
+              </a:lnSpc>
+              <a:buNone/>
             </a:pPr>
             <a:endParaRPr lang="en-US" dirty="0" smtClean="0"/>
           </a:p>
           <a:p>
+            <a:pPr>
+              <a:lnSpc>
+                <a:spcPct val="90000"/>
+              </a:lnSpc>
+            </a:pPr>
             <a:r>
               <a:rPr lang="en-US" dirty="0" smtClean="0"/>
-              <a:t>Note</a:t>
+              <a:t>Data Mover</a:t>
             </a:r>
             <a:r>
               <a:rPr lang="en-US" baseline="0" dirty="0" smtClean="0"/>
-              <a:t> that the data passes through the Data Mover TMS for TD to TD moves, but not landing on disk. Performance is very dependent on the network connectivity in and out of the Data Mover TMS.</a:t>
-            </a:r>
+              <a:t> intelligently chooses the best method to copy data between Teradata systems dynamically.  It lets administrators concentrate on what they want to accomplish rather than how, allowing administrators enter the data copy intent while Data Mover determines the best method to copy the data.  </a:t>
+            </a:r>
+            <a:endParaRPr lang="en-US" dirty="0" smtClean="0"/>
+          </a:p>
+          <a:p>
+            <a:pPr>
+              <a:lnSpc>
+                <a:spcPct val="90000"/>
+              </a:lnSpc>
+            </a:pPr>
+            <a:endParaRPr lang="en-US" dirty="0" smtClean="0"/>
+          </a:p>
+          <a:p>
+            <a:pPr marL="173033" indent="-173033" defTabSz="914372" fontAlgn="base">
+              <a:lnSpc>
+                <a:spcPct val="90000"/>
+              </a:lnSpc>
+              <a:spcBef>
+                <a:spcPct val="30000"/>
+              </a:spcBef>
+              <a:spcAft>
+                <a:spcPct val="0"/>
+              </a:spcAft>
+              <a:defRPr/>
+            </a:pPr>
+            <a:r>
+              <a:rPr lang="en-US" dirty="0" smtClean="0"/>
+              <a:t>Data Mover can</a:t>
+            </a:r>
+            <a:r>
+              <a:rPr lang="en-US" baseline="0" dirty="0" smtClean="0"/>
+              <a:t> do full or partial table copies. To do a partial table copy a “where-clause” is given to Data Mover to grab only those rows that have been updated. To do that the table must be instrumented with a time-stamp or other indicator that a row has changed for Data Mover to be able to extract that row via the “where-clause”.</a:t>
+            </a:r>
+            <a:br>
+              <a:rPr lang="en-US" baseline="0" dirty="0" smtClean="0"/>
+            </a:br>
+            <a:endParaRPr lang="en-US" dirty="0" smtClean="0"/>
+          </a:p>
+          <a:p>
+            <a:pPr>
+              <a:lnSpc>
+                <a:spcPct val="90000"/>
+              </a:lnSpc>
+            </a:pPr>
+            <a:r>
+              <a:rPr lang="en-US" dirty="0" smtClean="0"/>
+              <a:t>Uses existing Teradata Utilities</a:t>
+            </a:r>
+          </a:p>
+          <a:p>
+            <a:pPr>
+              <a:lnSpc>
+                <a:spcPct val="90000"/>
+              </a:lnSpc>
+            </a:pPr>
+            <a:r>
+              <a:rPr lang="en-US" dirty="0" smtClean="0"/>
+              <a:t>Uses ARC if a full table, this is the fastest.  If not, will use load/unload; </a:t>
+            </a:r>
+            <a:r>
+              <a:rPr lang="en-US" dirty="0" err="1" smtClean="0"/>
+              <a:t>fastload</a:t>
+            </a:r>
+            <a:r>
+              <a:rPr lang="en-US" dirty="0" smtClean="0"/>
+              <a:t> if empty table. </a:t>
+            </a:r>
+          </a:p>
+          <a:p>
+            <a:pPr>
+              <a:lnSpc>
+                <a:spcPct val="90000"/>
+              </a:lnSpc>
+            </a:pPr>
+            <a:endParaRPr lang="en-US" dirty="0" smtClean="0"/>
+          </a:p>
+          <a:p>
             <a:endParaRPr lang="en-US" dirty="0"/>
           </a:p>
         </p:txBody>
       </p:sp>
       <p:sp>
         <p:nvSpPr>
-          <p:cNvPr id="4" name="Slide Number Placeholder 3"/>
+          <p:cNvPr id="4" name="Footer Placeholder 3"/>
           <p:cNvSpPr>
             <a:spLocks noGrp="1"/>
           </p:cNvSpPr>
           <p:nvPr>
-            <p:ph type="sldNum" sz="quarter" idx="10"/>
+            <p:ph type="ftr" sz="quarter" idx="10"/>
           </p:nvPr>
         </p:nvSpPr>
-        <p:spPr>
-          <a:xfrm>
-            <a:off x="3884615" y="8685213"/>
-            <a:ext cx="2971800" cy="457200"/>
-          </a:xfrm>
-          <a:prstGeom prst="rect">
-            <a:avLst/>
-          </a:prstGeom>
-        </p:spPr>
+        <p:spPr/>
         <p:txBody>
-          <a:bodyPr lIns="90396" tIns="45198" rIns="90396" bIns="45198"/>
+          <a:bodyPr/>
           <a:lstStyle/>
           <a:p>
-            <a:fld id="{FF04AF13-00D5-4493-9191-4AE0E8CE6465}" type="slidenum">
-              <a:rPr lang="en-US" smtClean="0">
-                <a:solidFill>
-                  <a:prstClr val="black"/>
-                </a:solidFill>
-                <a:latin typeface="Calibri"/>
-              </a:rPr>
-              <a:pPr/>
-              <a:t>11</a:t>
-            </a:fld>
-            <a:endParaRPr lang="en-US" dirty="0">
-              <a:solidFill>
-                <a:prstClr val="black"/>
-              </a:solidFill>
-              <a:latin typeface="Calibri"/>
-            </a:endParaRPr>
+            <a:r>
+              <a:rPr lang="en-US" smtClean="0"/>
+              <a:t>© 2014 Teradata</a:t>
+            </a:r>
+            <a:endParaRPr lang="en-US"/>
           </a:p>
         </p:txBody>
       </p:sp>
     </p:spTree>
     <p:extLst>
       <p:ext uri="{BB962C8B-B14F-4D97-AF65-F5344CB8AC3E}">
-        <p14:creationId xmlns:p14="http://schemas.microsoft.com/office/powerpoint/2010/main" val="114520766"/>
+        <p14:creationId xmlns:p14="http://schemas.microsoft.com/office/powerpoint/2010/main" val="2920082167"/>
       </p:ext>
     </p:extLst>
   </p:cSld>
@@ -11126,84 +11209,76 @@
           <a:bodyPr/>
           <a:lstStyle/>
           <a:p>
-            <a:r>
-              <a:rPr lang="en-US" dirty="0" smtClean="0"/>
-              <a:t>Data Mover operates mostly the same way for TD/Aster and TD/Hadoop data moves. User intent is entered via the</a:t>
-            </a:r>
-            <a:r>
-              <a:rPr lang="en-US" baseline="0" dirty="0" smtClean="0"/>
-              <a:t> same two mechanisms of the Viewpoint Portlet and Command Line Interface. It is then </a:t>
-            </a:r>
-            <a:r>
-              <a:rPr lang="en-US" dirty="0" smtClean="0"/>
-              <a:t>translated</a:t>
-            </a:r>
-            <a:r>
-              <a:rPr lang="en-US" baseline="0" dirty="0" smtClean="0"/>
-              <a:t> into a Data Mover job to do the actual move.</a:t>
-            </a:r>
-          </a:p>
-          <a:p>
-            <a:endParaRPr lang="en-US" baseline="0" dirty="0" smtClean="0"/>
-          </a:p>
-          <a:p>
             <a:pPr marL="0" indent="0">
               <a:buNone/>
             </a:pPr>
             <a:r>
+              <a:rPr lang="en-US" dirty="0" smtClean="0"/>
+              <a:t>This chart shows the Data Mover architecture.</a:t>
+            </a:r>
+          </a:p>
+          <a:p>
+            <a:endParaRPr lang="en-US" dirty="0" smtClean="0"/>
+          </a:p>
+          <a:p>
+            <a:r>
+              <a:rPr lang="en-US" dirty="0" smtClean="0"/>
+              <a:t>Starting from the top:</a:t>
+            </a:r>
+            <a:br>
+              <a:rPr lang="en-US" dirty="0" smtClean="0"/>
+            </a:br>
+            <a:endParaRPr lang="en-US" dirty="0" smtClean="0"/>
+          </a:p>
+          <a:p>
+            <a:pPr marL="685757" lvl="1" indent="-228586">
+              <a:buFont typeface="+mj-lt"/>
+              <a:buAutoNum type="arabicPeriod"/>
+            </a:pPr>
+            <a:r>
+              <a:rPr lang="en-US" dirty="0" smtClean="0"/>
+              <a:t>The</a:t>
+            </a:r>
+            <a:r>
               <a:rPr lang="en-US" baseline="0" dirty="0" smtClean="0"/>
-              <a:t>There are different utility options for Data Mover to choose from in Aster and Hadoop data movements.</a:t>
-            </a:r>
-          </a:p>
-          <a:p>
-            <a:pPr lvl="1"/>
+              <a:t> user’s intent is entered either via the Viewpoint portlet or the Command Line Interface.</a:t>
+            </a:r>
+          </a:p>
+          <a:p>
+            <a:pPr marL="685757" lvl="1" indent="-228586">
+              <a:buFont typeface="+mj-lt"/>
+              <a:buAutoNum type="arabicPeriod"/>
+            </a:pPr>
             <a:r>
               <a:rPr lang="en-US" baseline="0" dirty="0" smtClean="0"/>
-              <a:t>For Aster the Teradata-Aster Connector is used. This is based on a combination of TPT Fastload protocol and </a:t>
-            </a:r>
-            <a:r>
-              <a:rPr lang="en-US" baseline="0" dirty="0" err="1" smtClean="0"/>
-              <a:t>SQl</a:t>
+              <a:t>The Data Mover Daemon takes that intent and turns it into a Data Mover job.</a:t>
+            </a:r>
+          </a:p>
+          <a:p>
+            <a:pPr marL="685757" lvl="1" indent="-228586">
+              <a:buFont typeface="+mj-lt"/>
+              <a:buAutoNum type="arabicPeriod"/>
+            </a:pPr>
+            <a:r>
+              <a:rPr lang="en-US" dirty="0" smtClean="0"/>
+              <a:t>The Data Mover job is then passed to the Data Mover Agent for execution.</a:t>
+            </a:r>
+          </a:p>
+          <a:p>
+            <a:pPr marL="685757" lvl="1" indent="-228586">
+              <a:buFont typeface="+mj-lt"/>
+              <a:buAutoNum type="arabicPeriod"/>
+            </a:pPr>
+            <a:endParaRPr lang="en-US" dirty="0" smtClean="0"/>
+          </a:p>
+          <a:p>
+            <a:r>
+              <a:rPr lang="en-US" dirty="0" smtClean="0"/>
+              <a:t>Note</a:t>
             </a:r>
             <a:r>
               <a:rPr lang="en-US" baseline="0" dirty="0" smtClean="0"/>
-              <a:t>-MR commands.</a:t>
-            </a:r>
-          </a:p>
-          <a:p>
-            <a:pPr lvl="1"/>
-            <a:r>
-              <a:rPr lang="en-US" baseline="0" dirty="0" smtClean="0"/>
-              <a:t>For Hadoop the Teradata Connector for Hadoop or the SQL-H Query Grid command is chosen. Data Mover will use SQL-H </a:t>
-            </a:r>
-            <a:r>
-              <a:rPr lang="en-US" baseline="0" dirty="0" smtClean="0"/>
-              <a:t>if </a:t>
-            </a:r>
-            <a:r>
-              <a:rPr lang="en-US" baseline="0" dirty="0" smtClean="0"/>
-              <a:t>the </a:t>
-            </a:r>
-            <a:r>
-              <a:rPr lang="en-US" baseline="0" dirty="0" smtClean="0"/>
-              <a:t>site is </a:t>
-            </a:r>
-            <a:r>
-              <a:rPr lang="en-US" baseline="0" dirty="0" smtClean="0"/>
-              <a:t>on TD 14.10 or greater and has purchased the Query Grid option.</a:t>
-            </a:r>
-            <a:br>
-              <a:rPr lang="en-US" baseline="0" dirty="0" smtClean="0"/>
-            </a:br>
-            <a:endParaRPr lang="en-US" baseline="0" dirty="0" smtClean="0"/>
-          </a:p>
-          <a:p>
-            <a:pPr marL="0" indent="0">
-              <a:buNone/>
-            </a:pPr>
-            <a:r>
-              <a:rPr lang="en-US" baseline="0" dirty="0" smtClean="0"/>
-              <a:t>Another key difference is that the data being moved does not pass through the Data Mover TMS. The two systems communicate directly with each other which avoids the extra network hop. Data Mover creates the SQL commands necessary to perform the data move and then gets out of the way.</a:t>
+              <a:t> that the data passes through the Data Mover TMS for TD to TD moves, but not landing on disk. Performance is very dependent on the network connectivity in and out of the Data Mover TMS.</a:t>
             </a:r>
             <a:endParaRPr lang="en-US" dirty="0"/>
           </a:p>
@@ -11240,9 +11315,9 @@
                 <a:latin typeface="Calibri"/>
               </a:rPr>
               <a:pPr/>
-              <a:t>12</a:t>
+              <a:t>11</a:t>
             </a:fld>
-            <a:endParaRPr lang="en-US">
+            <a:endParaRPr lang="en-US" dirty="0">
               <a:solidFill>
                 <a:prstClr val="black"/>
               </a:solidFill>
@@ -11254,7 +11329,7 @@
     </p:spTree>
     <p:extLst>
       <p:ext uri="{BB962C8B-B14F-4D97-AF65-F5344CB8AC3E}">
-        <p14:creationId xmlns:p14="http://schemas.microsoft.com/office/powerpoint/2010/main" val="2179764985"/>
+        <p14:creationId xmlns:p14="http://schemas.microsoft.com/office/powerpoint/2010/main" val="114520766"/>
       </p:ext>
     </p:extLst>
   </p:cSld>
@@ -17266,7 +17341,7 @@
               <a:pPr>
                 <a:defRPr/>
               </a:pPr>
-              <a:t>11:52 AM</a:t>
+              <a:t>12:18 PM</a:t>
             </a:fld>
             <a:endParaRPr lang="en-US" dirty="0"/>
           </a:p>
@@ -17413,7 +17488,7 @@
               <a:pPr>
                 <a:defRPr/>
               </a:pPr>
-              <a:t>11:52 AM</a:t>
+              <a:t>12:18 PM</a:t>
             </a:fld>
             <a:endParaRPr lang="en-US" dirty="0"/>
           </a:p>
@@ -17560,7 +17635,7 @@
               <a:pPr>
                 <a:defRPr/>
               </a:pPr>
-              <a:t>11:52 AM</a:t>
+              <a:t>12:18 PM</a:t>
             </a:fld>
             <a:endParaRPr lang="en-US" dirty="0"/>
           </a:p>
@@ -17632,7 +17707,7 @@
               <a:pPr>
                 <a:defRPr/>
               </a:pPr>
-              <a:t>11:52 AM</a:t>
+              <a:t>12:18 PM</a:t>
             </a:fld>
             <a:endParaRPr lang="en-US" dirty="0"/>
           </a:p>
@@ -17779,7 +17854,7 @@
               <a:pPr>
                 <a:defRPr/>
               </a:pPr>
-              <a:t>11:52 AM</a:t>
+              <a:t>12:18 PM</a:t>
             </a:fld>
             <a:endParaRPr lang="en-US" dirty="0"/>
           </a:p>
@@ -17926,7 +18001,7 @@
               <a:pPr>
                 <a:defRPr/>
               </a:pPr>
-              <a:t>11:52 AM</a:t>
+              <a:t>12:18 PM</a:t>
             </a:fld>
             <a:endParaRPr lang="en-US" dirty="0"/>
           </a:p>
@@ -18073,7 +18148,7 @@
               <a:pPr>
                 <a:defRPr/>
               </a:pPr>
-              <a:t>11:52 AM</a:t>
+              <a:t>12:18 PM</a:t>
             </a:fld>
             <a:endParaRPr lang="en-US" dirty="0"/>
           </a:p>
@@ -18220,7 +18295,7 @@
               <a:pPr>
                 <a:defRPr/>
               </a:pPr>
-              <a:t>11:52 AM</a:t>
+              <a:t>12:18 PM</a:t>
             </a:fld>
             <a:endParaRPr lang="en-US" dirty="0"/>
           </a:p>
@@ -18367,7 +18442,7 @@
               <a:pPr>
                 <a:defRPr/>
               </a:pPr>
-              <a:t>11:52 AM</a:t>
+              <a:t>12:18 PM</a:t>
             </a:fld>
             <a:endParaRPr lang="en-US" dirty="0"/>
           </a:p>
@@ -18514,7 +18589,7 @@
               <a:pPr>
                 <a:defRPr/>
               </a:pPr>
-              <a:t>11:52 AM</a:t>
+              <a:t>12:18 PM</a:t>
             </a:fld>
             <a:endParaRPr lang="en-US" dirty="0"/>
           </a:p>
@@ -23299,11 +23374,7 @@
           <a:p>
             <a:r>
               <a:rPr lang="en-US" dirty="0" smtClean="0"/>
-              <a:t>Teradata Data </a:t>
-            </a:r>
-            <a:r>
-              <a:rPr lang="en-US" dirty="0" smtClean="0"/>
-              <a:t>Mover – </a:t>
+              <a:t>Teradata Data Mover – </a:t>
             </a:r>
             <a:r>
               <a:rPr lang="en-US" dirty="0" smtClean="0">
@@ -36250,7 +36321,6 @@
               <a:rPr lang="en-US" dirty="0" smtClean="0"/>
               <a:t>New Table Validation Thresholds</a:t>
             </a:r>
-            <a:endParaRPr lang="en-US" dirty="0" smtClean="0"/>
           </a:p>
           <a:p>
             <a:r>
@@ -38246,16 +38316,6 @@
               </a:rPr>
               <a:t>Passive Routing </a:t>
             </a:r>
-            <a:endParaRPr lang="en-US" sz="2800" b="1" cap="all" dirty="0">
-              <a:ln w="0"/>
-              <a:solidFill>
-                <a:srgbClr val="0070C0"/>
-              </a:solidFill>
-              <a:effectLst>
-                <a:reflection blurRad="12700" stA="50000" endPos="50000" dist="5000" dir="5400000" sy="-100000" rotWithShape="0"/>
-              </a:effectLst>
-              <a:ea typeface="ＭＳ Ｐゴシック" charset="-128"/>
-            </a:endParaRPr>
           </a:p>
         </p:txBody>
       </p:sp>
@@ -38618,7 +38678,7 @@
                 <a:buFontTx/>
                 <a:buNone/>
               </a:pPr>
-              <a:t>1:42 PM</a:t>
+              <a:t>12:18 PM</a:t>
             </a:fld>
             <a:endParaRPr lang="en-US" altLang="en-US" sz="800" smtClean="0">
               <a:ea typeface="ＭＳ Ｐゴシック" pitchFamily="34" charset="-128"/>
@@ -38852,7 +38912,7 @@
                 <a:buFontTx/>
                 <a:buNone/>
               </a:pPr>
-              <a:t>1:42 PM</a:t>
+              <a:t>12:18 PM</a:t>
             </a:fld>
             <a:endParaRPr lang="en-US" altLang="en-US" sz="800" smtClean="0">
               <a:ea typeface="ＭＳ Ｐゴシック" pitchFamily="34" charset="-128"/>
@@ -40002,7 +40062,7 @@
                 <a:buFontTx/>
                 <a:buNone/>
               </a:pPr>
-              <a:t>1:42 PM</a:t>
+              <a:t>12:18 PM</a:t>
             </a:fld>
             <a:endParaRPr lang="en-US" altLang="en-US" sz="800" smtClean="0">
               <a:ea typeface="ＭＳ Ｐゴシック" pitchFamily="34" charset="-128"/>
@@ -41089,7 +41149,6 @@
               <a:rPr lang="en-US" dirty="0" smtClean="0"/>
               <a:t>New Table Validation Thresholds</a:t>
             </a:r>
-            <a:endParaRPr lang="en-US" dirty="0" smtClean="0"/>
           </a:p>
           <a:p>
             <a:r>
@@ -42381,7 +42440,7 @@
                 <a:buFontTx/>
                 <a:buNone/>
               </a:pPr>
-              <a:t>1:42 PM</a:t>
+              <a:t>12:18 PM</a:t>
             </a:fld>
             <a:endParaRPr lang="en-US" altLang="en-US" sz="800" smtClean="0">
               <a:ea typeface="ＭＳ Ｐゴシック" pitchFamily="34" charset="-128"/>
@@ -42615,7 +42674,7 @@
                 <a:buFontTx/>
                 <a:buNone/>
               </a:pPr>
-              <a:t>1:42 PM</a:t>
+              <a:t>12:18 PM</a:t>
             </a:fld>
             <a:endParaRPr lang="en-US" altLang="en-US" sz="800" smtClean="0">
               <a:ea typeface="ＭＳ Ｐゴシック" pitchFamily="34" charset="-128"/>
@@ -43698,7 +43757,7 @@
                 <a:buFontTx/>
                 <a:buNone/>
               </a:pPr>
-              <a:t>1:42 PM</a:t>
+              <a:t>12:18 PM</a:t>
             </a:fld>
             <a:endParaRPr lang="en-US" altLang="en-US" sz="800" smtClean="0">
               <a:ea typeface="ＭＳ Ｐゴシック" pitchFamily="34" charset="-128"/>
@@ -45029,7 +45088,7 @@
                 <a:buFontTx/>
                 <a:buNone/>
               </a:pPr>
-              <a:t>1:42 PM</a:t>
+              <a:t>12:18 PM</a:t>
             </a:fld>
             <a:endParaRPr lang="en-US" altLang="en-US" sz="800" smtClean="0">
               <a:ea typeface="ＭＳ Ｐゴシック" pitchFamily="34" charset="-128"/>
@@ -45396,7 +45455,7 @@
                 <a:buFontTx/>
                 <a:buNone/>
               </a:pPr>
-              <a:t>1:42 PM</a:t>
+              <a:t>12:18 PM</a:t>
             </a:fld>
             <a:endParaRPr lang="en-US" altLang="en-US" sz="800" smtClean="0">
               <a:ea typeface="ＭＳ Ｐゴシック" pitchFamily="34" charset="-128"/>
@@ -46238,7 +46297,7 @@
                 <a:buFontTx/>
                 <a:buNone/>
               </a:pPr>
-              <a:t>1:42 PM</a:t>
+              <a:t>12:18 PM</a:t>
             </a:fld>
             <a:endParaRPr lang="en-US" altLang="en-US" sz="800" smtClean="0">
               <a:ea typeface="ＭＳ Ｐゴシック" pitchFamily="34" charset="-128"/>
@@ -46472,7 +46531,7 @@
                 <a:buFontTx/>
                 <a:buNone/>
               </a:pPr>
-              <a:t>1:42 PM</a:t>
+              <a:t>12:18 PM</a:t>
             </a:fld>
             <a:endParaRPr lang="en-US" altLang="en-US" sz="800" smtClean="0">
               <a:ea typeface="ＭＳ Ｐゴシック" pitchFamily="34" charset="-128"/>
@@ -47828,11 +47887,7 @@
           <a:p>
             <a:r>
               <a:rPr lang="en-US" dirty="0" smtClean="0"/>
-              <a:t>Teradata </a:t>
-            </a:r>
-            <a:r>
-              <a:rPr lang="en-US" dirty="0" smtClean="0"/>
-              <a:t>and RE-branding	</a:t>
+              <a:t>Teradata and RE-branding	</a:t>
             </a:r>
             <a:endParaRPr lang="en-US" dirty="0"/>
           </a:p>
@@ -50915,7 +50970,6 @@
               <a:rPr lang="en-US" dirty="0" smtClean="0"/>
               <a:t>New Table Validation Thresholds</a:t>
             </a:r>
-            <a:endParaRPr lang="en-US" dirty="0" smtClean="0"/>
           </a:p>
           <a:p>
             <a:r>
@@ -51076,11 +51130,7 @@
           <a:p>
             <a:r>
               <a:rPr lang="en-US" sz="2400" dirty="0" smtClean="0"/>
-              <a:t>Teradata </a:t>
-            </a:r>
-            <a:r>
-              <a:rPr lang="en-US" sz="2400" dirty="0" smtClean="0"/>
-              <a:t>Ecosystem Manager</a:t>
+              <a:t>Teradata Ecosystem Manager</a:t>
             </a:r>
           </a:p>
           <a:p>
@@ -51227,11 +51277,7 @@
           <a:p>
             <a:r>
               <a:rPr lang="en-US" dirty="0" smtClean="0"/>
-              <a:t>Teradata </a:t>
-            </a:r>
-            <a:r>
-              <a:rPr lang="en-US" dirty="0" smtClean="0"/>
-              <a:t>Ecosystem Manager</a:t>
+              <a:t>Teradata Ecosystem Manager</a:t>
             </a:r>
             <a:endParaRPr lang="en-US" dirty="0"/>
           </a:p>
@@ -51417,11 +51463,7 @@
           <a:p>
             <a:r>
               <a:rPr lang="en-US" dirty="0" smtClean="0"/>
-              <a:t>Teradata </a:t>
-            </a:r>
-            <a:r>
-              <a:rPr lang="en-US" dirty="0" smtClean="0"/>
-              <a:t>Ecosystem Manager</a:t>
+              <a:t>Teradata Ecosystem Manager</a:t>
             </a:r>
             <a:endParaRPr lang="en-US" dirty="0"/>
           </a:p>
@@ -51662,11 +51704,7 @@
           <a:p>
             <a:r>
               <a:rPr lang="en-US" dirty="0" smtClean="0"/>
-              <a:t>Teradata </a:t>
-            </a:r>
-            <a:r>
-              <a:rPr lang="en-US" dirty="0" smtClean="0"/>
-              <a:t>Ecosystem Manager</a:t>
+              <a:t>Teradata Ecosystem Manager</a:t>
             </a:r>
             <a:endParaRPr lang="en-US" dirty="0"/>
           </a:p>
@@ -51814,11 +51852,7 @@
           <a:p>
             <a:r>
               <a:rPr lang="en-US" dirty="0" smtClean="0"/>
-              <a:t>Teradata </a:t>
-            </a:r>
-            <a:r>
-              <a:rPr lang="en-US" dirty="0" smtClean="0"/>
-              <a:t>Data Mover – Feature Summary</a:t>
+              <a:t>Teradata Data Mover – Feature Summary</a:t>
             </a:r>
             <a:endParaRPr lang="en-US" dirty="0"/>
           </a:p>
@@ -51957,7 +51991,6 @@
               <a:rPr lang="en-US" dirty="0" smtClean="0"/>
               <a:t>New Table Validation Thresholds</a:t>
             </a:r>
-            <a:endParaRPr lang="en-US" dirty="0" smtClean="0"/>
           </a:p>
           <a:p>
             <a:r>

</xml_diff>